<commit_message>
updating powerpoint, math.go comment and adding point.go
</commit_message>
<xml_diff>
--- a/assets/powerpoints/golang2.pptx
+++ b/assets/powerpoints/golang2.pptx
@@ -5,16 +5,17 @@
     <p:sldMasterId id="2147483648" r:id="rId1"/>
   </p:sldMasterIdLst>
   <p:notesMasterIdLst>
-    <p:notesMasterId r:id="rId9"/>
+    <p:notesMasterId r:id="rId10"/>
   </p:notesMasterIdLst>
   <p:sldIdLst>
     <p:sldId id="258" r:id="rId2"/>
     <p:sldId id="262" r:id="rId3"/>
-    <p:sldId id="259" r:id="rId4"/>
-    <p:sldId id="260" r:id="rId5"/>
-    <p:sldId id="263" r:id="rId6"/>
-    <p:sldId id="264" r:id="rId7"/>
-    <p:sldId id="261" r:id="rId8"/>
+    <p:sldId id="263" r:id="rId4"/>
+    <p:sldId id="259" r:id="rId5"/>
+    <p:sldId id="260" r:id="rId6"/>
+    <p:sldId id="265" r:id="rId7"/>
+    <p:sldId id="264" r:id="rId8"/>
+    <p:sldId id="261" r:id="rId9"/>
   </p:sldIdLst>
   <p:sldSz cx="12192000" cy="6858000"/>
   <p:notesSz cx="6858000" cy="9144000"/>
@@ -215,7 +216,7 @@
           <a:p>
             <a:fld id="{AB412791-CB19-4B63-9963-8A77FB30904D}" type="datetimeFigureOut">
               <a:rPr lang="en-US" smtClean="0"/>
-              <a:t>4/6/2019</a:t>
+              <a:t>4/12/2019</a:t>
             </a:fld>
             <a:endParaRPr lang="en-US"/>
           </a:p>
@@ -651,6 +652,36 @@
               <a:buFontTx/>
               <a:buNone/>
             </a:pPr>
+            <a:endParaRPr lang="en-US" dirty="0" smtClean="0"/>
+          </a:p>
+          <a:p>
+            <a:pPr marL="0" indent="0">
+              <a:buFontTx/>
+              <a:buNone/>
+            </a:pPr>
+            <a:r>
+              <a:rPr lang="en-US" dirty="0" err="1" smtClean="0"/>
+              <a:t>Package_tutorial</a:t>
+            </a:r>
+            <a:r>
+              <a:rPr lang="en-US" baseline="0" dirty="0" smtClean="0"/>
+              <a:t> – The package tutorial uses 3 packages lets cover the first package util.</a:t>
+            </a:r>
+            <a:endParaRPr lang="en-US" dirty="0" smtClean="0"/>
+          </a:p>
+          <a:p>
+            <a:pPr marL="0" indent="0">
+              <a:buFontTx/>
+              <a:buNone/>
+            </a:pPr>
+            <a:r>
+              <a:rPr lang="en-US" dirty="0" err="1" smtClean="0"/>
+              <a:t>Util</a:t>
+            </a:r>
+            <a:r>
+              <a:rPr lang="en-US" baseline="0" dirty="0" smtClean="0"/>
+              <a:t> – By convention package names are named the same thing as the directory name.</a:t>
+            </a:r>
             <a:endParaRPr lang="en-US" dirty="0"/>
           </a:p>
         </p:txBody>
@@ -773,7 +804,7 @@
             </a:r>
             <a:r>
               <a:rPr lang="en-US" baseline="0" dirty="0" err="1" smtClean="0"/>
-              <a:t>pointer.go</a:t>
+              <a:t>point.go</a:t>
             </a:r>
             <a:endParaRPr lang="en-US" baseline="0" dirty="0" smtClean="0"/>
           </a:p>
@@ -799,7 +830,7 @@
           <a:p>
             <a:fld id="{E7485AFA-8529-45AE-977F-998C2B043712}" type="slidenum">
               <a:rPr lang="en-US" smtClean="0"/>
-              <a:t>3</a:t>
+              <a:t>4</a:t>
             </a:fld>
             <a:endParaRPr lang="en-US"/>
           </a:p>
@@ -1111,7 +1142,7 @@
           <a:p>
             <a:fld id="{E7485AFA-8529-45AE-977F-998C2B043712}" type="slidenum">
               <a:rPr lang="en-US" smtClean="0"/>
-              <a:t>4</a:t>
+              <a:t>5</a:t>
             </a:fld>
             <a:endParaRPr lang="en-US"/>
           </a:p>
@@ -1261,7 +1292,7 @@
           <a:p>
             <a:fld id="{790ED757-B5C7-4A40-922E-B631E1D33579}" type="datetimeFigureOut">
               <a:rPr lang="en-US" smtClean="0"/>
-              <a:t>4/6/2019</a:t>
+              <a:t>4/12/2019</a:t>
             </a:fld>
             <a:endParaRPr lang="en-US"/>
           </a:p>
@@ -1431,7 +1462,7 @@
           <a:p>
             <a:fld id="{790ED757-B5C7-4A40-922E-B631E1D33579}" type="datetimeFigureOut">
               <a:rPr lang="en-US" smtClean="0"/>
-              <a:t>4/6/2019</a:t>
+              <a:t>4/12/2019</a:t>
             </a:fld>
             <a:endParaRPr lang="en-US"/>
           </a:p>
@@ -1611,7 +1642,7 @@
           <a:p>
             <a:fld id="{790ED757-B5C7-4A40-922E-B631E1D33579}" type="datetimeFigureOut">
               <a:rPr lang="en-US" smtClean="0"/>
-              <a:t>4/6/2019</a:t>
+              <a:t>4/12/2019</a:t>
             </a:fld>
             <a:endParaRPr lang="en-US"/>
           </a:p>
@@ -1781,7 +1812,7 @@
           <a:p>
             <a:fld id="{790ED757-B5C7-4A40-922E-B631E1D33579}" type="datetimeFigureOut">
               <a:rPr lang="en-US" smtClean="0"/>
-              <a:t>4/6/2019</a:t>
+              <a:t>4/12/2019</a:t>
             </a:fld>
             <a:endParaRPr lang="en-US"/>
           </a:p>
@@ -2027,7 +2058,7 @@
           <a:p>
             <a:fld id="{790ED757-B5C7-4A40-922E-B631E1D33579}" type="datetimeFigureOut">
               <a:rPr lang="en-US" smtClean="0"/>
-              <a:t>4/6/2019</a:t>
+              <a:t>4/12/2019</a:t>
             </a:fld>
             <a:endParaRPr lang="en-US"/>
           </a:p>
@@ -2259,7 +2290,7 @@
           <a:p>
             <a:fld id="{790ED757-B5C7-4A40-922E-B631E1D33579}" type="datetimeFigureOut">
               <a:rPr lang="en-US" smtClean="0"/>
-              <a:t>4/6/2019</a:t>
+              <a:t>4/12/2019</a:t>
             </a:fld>
             <a:endParaRPr lang="en-US"/>
           </a:p>
@@ -2626,7 +2657,7 @@
           <a:p>
             <a:fld id="{790ED757-B5C7-4A40-922E-B631E1D33579}" type="datetimeFigureOut">
               <a:rPr lang="en-US" smtClean="0"/>
-              <a:t>4/6/2019</a:t>
+              <a:t>4/12/2019</a:t>
             </a:fld>
             <a:endParaRPr lang="en-US"/>
           </a:p>
@@ -2744,7 +2775,7 @@
           <a:p>
             <a:fld id="{790ED757-B5C7-4A40-922E-B631E1D33579}" type="datetimeFigureOut">
               <a:rPr lang="en-US" smtClean="0"/>
-              <a:t>4/6/2019</a:t>
+              <a:t>4/12/2019</a:t>
             </a:fld>
             <a:endParaRPr lang="en-US"/>
           </a:p>
@@ -2839,7 +2870,7 @@
           <a:p>
             <a:fld id="{790ED757-B5C7-4A40-922E-B631E1D33579}" type="datetimeFigureOut">
               <a:rPr lang="en-US" smtClean="0"/>
-              <a:t>4/6/2019</a:t>
+              <a:t>4/12/2019</a:t>
             </a:fld>
             <a:endParaRPr lang="en-US"/>
           </a:p>
@@ -3116,7 +3147,7 @@
           <a:p>
             <a:fld id="{790ED757-B5C7-4A40-922E-B631E1D33579}" type="datetimeFigureOut">
               <a:rPr lang="en-US" smtClean="0"/>
-              <a:t>4/6/2019</a:t>
+              <a:t>4/12/2019</a:t>
             </a:fld>
             <a:endParaRPr lang="en-US"/>
           </a:p>
@@ -3369,7 +3400,7 @@
           <a:p>
             <a:fld id="{790ED757-B5C7-4A40-922E-B631E1D33579}" type="datetimeFigureOut">
               <a:rPr lang="en-US" smtClean="0"/>
-              <a:t>4/6/2019</a:t>
+              <a:t>4/12/2019</a:t>
             </a:fld>
             <a:endParaRPr lang="en-US"/>
           </a:p>
@@ -3582,7 +3613,7 @@
           <a:p>
             <a:fld id="{790ED757-B5C7-4A40-922E-B631E1D33579}" type="datetimeFigureOut">
               <a:rPr lang="en-US" smtClean="0"/>
-              <a:t>4/6/2019</a:t>
+              <a:t>4/12/2019</a:t>
             </a:fld>
             <a:endParaRPr lang="en-US"/>
           </a:p>
@@ -4640,7 +4671,7 @@
               <a:rPr lang="en-US" dirty="0" smtClean="0">
                 <a:latin typeface="Roboto"/>
               </a:rPr>
-              <a:t>Delve</a:t>
+              <a:t>Pointers</a:t>
             </a:r>
             <a:endParaRPr lang="en-US" dirty="0">
               <a:latin typeface="Roboto"/>
@@ -4663,6 +4694,84 @@
           <a:bodyPr/>
           <a:lstStyle/>
           <a:p>
+            <a:endParaRPr lang="en-US" dirty="0">
+              <a:latin typeface="Roboto"/>
+            </a:endParaRPr>
+          </a:p>
+        </p:txBody>
+      </p:sp>
+    </p:spTree>
+    <p:extLst>
+      <p:ext uri="{BB962C8B-B14F-4D97-AF65-F5344CB8AC3E}">
+        <p14:creationId xmlns:p14="http://schemas.microsoft.com/office/powerpoint/2010/main" val="3588562914"/>
+      </p:ext>
+    </p:extLst>
+  </p:cSld>
+  <p:clrMapOvr>
+    <a:masterClrMapping/>
+  </p:clrMapOvr>
+</p:sld>
+</file>
+
+<file path=ppt/slides/slide4.xml><?xml version="1.0" encoding="utf-8"?>
+<p:sld xmlns:a="http://schemas.openxmlformats.org/drawingml/2006/main" xmlns:r="http://schemas.openxmlformats.org/officeDocument/2006/relationships" xmlns:p="http://schemas.openxmlformats.org/presentationml/2006/main">
+  <p:cSld>
+    <p:spTree>
+      <p:nvGrpSpPr>
+        <p:cNvPr id="1" name=""/>
+        <p:cNvGrpSpPr/>
+        <p:nvPr/>
+      </p:nvGrpSpPr>
+      <p:grpSpPr>
+        <a:xfrm>
+          <a:off x="0" y="0"/>
+          <a:ext cx="0" cy="0"/>
+          <a:chOff x="0" y="0"/>
+          <a:chExt cx="0" cy="0"/>
+        </a:xfrm>
+      </p:grpSpPr>
+      <p:sp>
+        <p:nvSpPr>
+          <p:cNvPr id="2" name="Title 1"/>
+          <p:cNvSpPr>
+            <a:spLocks noGrp="1"/>
+          </p:cNvSpPr>
+          <p:nvPr>
+            <p:ph type="title"/>
+          </p:nvPr>
+        </p:nvSpPr>
+        <p:spPr/>
+        <p:txBody>
+          <a:bodyPr/>
+          <a:lstStyle/>
+          <a:p>
+            <a:r>
+              <a:rPr lang="en-US" dirty="0" smtClean="0">
+                <a:latin typeface="Roboto"/>
+              </a:rPr>
+              <a:t>Delve</a:t>
+            </a:r>
+            <a:endParaRPr lang="en-US" dirty="0">
+              <a:latin typeface="Roboto"/>
+            </a:endParaRPr>
+          </a:p>
+        </p:txBody>
+      </p:sp>
+      <p:sp>
+        <p:nvSpPr>
+          <p:cNvPr id="3" name="Content Placeholder 2"/>
+          <p:cNvSpPr>
+            <a:spLocks noGrp="1"/>
+          </p:cNvSpPr>
+          <p:nvPr>
+            <p:ph idx="1"/>
+          </p:nvPr>
+        </p:nvSpPr>
+        <p:spPr/>
+        <p:txBody>
+          <a:bodyPr/>
+          <a:lstStyle/>
+          <a:p>
             <a:r>
               <a:rPr lang="en-US" dirty="0" smtClean="0">
                 <a:latin typeface="Roboto"/>
@@ -4698,7 +4807,7 @@
               <a:rPr lang="en-US" dirty="0" err="1" smtClean="0">
                 <a:latin typeface="Roboto"/>
               </a:rPr>
-              <a:t>pointer.go</a:t>
+              <a:t>point.go</a:t>
             </a:r>
             <a:endParaRPr lang="en-US" dirty="0" smtClean="0">
               <a:latin typeface="Roboto"/>
@@ -4734,7 +4843,7 @@
 </p:sld>
 </file>
 
-<file path=ppt/slides/slide4.xml><?xml version="1.0" encoding="utf-8"?>
+<file path=ppt/slides/slide5.xml><?xml version="1.0" encoding="utf-8"?>
 <p:sld xmlns:a="http://schemas.openxmlformats.org/drawingml/2006/main" xmlns:r="http://schemas.openxmlformats.org/officeDocument/2006/relationships" xmlns:p="http://schemas.openxmlformats.org/presentationml/2006/main">
   <p:cSld>
     <p:spTree>
@@ -5475,78 +5584,6 @@
 </p:sld>
 </file>
 
-<file path=ppt/slides/slide5.xml><?xml version="1.0" encoding="utf-8"?>
-<p:sld xmlns:a="http://schemas.openxmlformats.org/drawingml/2006/main" xmlns:r="http://schemas.openxmlformats.org/officeDocument/2006/relationships" xmlns:p="http://schemas.openxmlformats.org/presentationml/2006/main">
-  <p:cSld>
-    <p:spTree>
-      <p:nvGrpSpPr>
-        <p:cNvPr id="1" name=""/>
-        <p:cNvGrpSpPr/>
-        <p:nvPr/>
-      </p:nvGrpSpPr>
-      <p:grpSpPr>
-        <a:xfrm>
-          <a:off x="0" y="0"/>
-          <a:ext cx="0" cy="0"/>
-          <a:chOff x="0" y="0"/>
-          <a:chExt cx="0" cy="0"/>
-        </a:xfrm>
-      </p:grpSpPr>
-      <p:sp>
-        <p:nvSpPr>
-          <p:cNvPr id="2" name="Title 1"/>
-          <p:cNvSpPr>
-            <a:spLocks noGrp="1"/>
-          </p:cNvSpPr>
-          <p:nvPr>
-            <p:ph type="title"/>
-          </p:nvPr>
-        </p:nvSpPr>
-        <p:spPr/>
-        <p:txBody>
-          <a:bodyPr/>
-          <a:lstStyle/>
-          <a:p>
-            <a:endParaRPr lang="en-US" dirty="0">
-              <a:latin typeface="Roboto"/>
-            </a:endParaRPr>
-          </a:p>
-        </p:txBody>
-      </p:sp>
-      <p:sp>
-        <p:nvSpPr>
-          <p:cNvPr id="3" name="Content Placeholder 2"/>
-          <p:cNvSpPr>
-            <a:spLocks noGrp="1"/>
-          </p:cNvSpPr>
-          <p:nvPr>
-            <p:ph idx="1"/>
-          </p:nvPr>
-        </p:nvSpPr>
-        <p:spPr/>
-        <p:txBody>
-          <a:bodyPr/>
-          <a:lstStyle/>
-          <a:p>
-            <a:endParaRPr lang="en-US" dirty="0">
-              <a:latin typeface="Roboto"/>
-            </a:endParaRPr>
-          </a:p>
-        </p:txBody>
-      </p:sp>
-    </p:spTree>
-    <p:extLst>
-      <p:ext uri="{BB962C8B-B14F-4D97-AF65-F5344CB8AC3E}">
-        <p14:creationId xmlns:p14="http://schemas.microsoft.com/office/powerpoint/2010/main" val="3588562914"/>
-      </p:ext>
-    </p:extLst>
-  </p:cSld>
-  <p:clrMapOvr>
-    <a:masterClrMapping/>
-  </p:clrMapOvr>
-</p:sld>
-</file>
-
 <file path=ppt/slides/slide6.xml><?xml version="1.0" encoding="utf-8"?>
 <p:sld xmlns:a="http://schemas.openxmlformats.org/drawingml/2006/main" xmlns:r="http://schemas.openxmlformats.org/officeDocument/2006/relationships" xmlns:p="http://schemas.openxmlformats.org/presentationml/2006/main">
   <p:cSld>
@@ -5609,6 +5646,78 @@
     </p:spTree>
     <p:extLst>
       <p:ext uri="{BB962C8B-B14F-4D97-AF65-F5344CB8AC3E}">
+        <p14:creationId xmlns:p14="http://schemas.microsoft.com/office/powerpoint/2010/main" val="1390304271"/>
+      </p:ext>
+    </p:extLst>
+  </p:cSld>
+  <p:clrMapOvr>
+    <a:masterClrMapping/>
+  </p:clrMapOvr>
+</p:sld>
+</file>
+
+<file path=ppt/slides/slide7.xml><?xml version="1.0" encoding="utf-8"?>
+<p:sld xmlns:a="http://schemas.openxmlformats.org/drawingml/2006/main" xmlns:r="http://schemas.openxmlformats.org/officeDocument/2006/relationships" xmlns:p="http://schemas.openxmlformats.org/presentationml/2006/main">
+  <p:cSld>
+    <p:spTree>
+      <p:nvGrpSpPr>
+        <p:cNvPr id="1" name=""/>
+        <p:cNvGrpSpPr/>
+        <p:nvPr/>
+      </p:nvGrpSpPr>
+      <p:grpSpPr>
+        <a:xfrm>
+          <a:off x="0" y="0"/>
+          <a:ext cx="0" cy="0"/>
+          <a:chOff x="0" y="0"/>
+          <a:chExt cx="0" cy="0"/>
+        </a:xfrm>
+      </p:grpSpPr>
+      <p:sp>
+        <p:nvSpPr>
+          <p:cNvPr id="2" name="Title 1"/>
+          <p:cNvSpPr>
+            <a:spLocks noGrp="1"/>
+          </p:cNvSpPr>
+          <p:nvPr>
+            <p:ph type="title"/>
+          </p:nvPr>
+        </p:nvSpPr>
+        <p:spPr/>
+        <p:txBody>
+          <a:bodyPr/>
+          <a:lstStyle/>
+          <a:p>
+            <a:endParaRPr lang="en-US" dirty="0">
+              <a:latin typeface="Roboto"/>
+            </a:endParaRPr>
+          </a:p>
+        </p:txBody>
+      </p:sp>
+      <p:sp>
+        <p:nvSpPr>
+          <p:cNvPr id="3" name="Content Placeholder 2"/>
+          <p:cNvSpPr>
+            <a:spLocks noGrp="1"/>
+          </p:cNvSpPr>
+          <p:nvPr>
+            <p:ph idx="1"/>
+          </p:nvPr>
+        </p:nvSpPr>
+        <p:spPr/>
+        <p:txBody>
+          <a:bodyPr/>
+          <a:lstStyle/>
+          <a:p>
+            <a:endParaRPr lang="en-US" dirty="0">
+              <a:latin typeface="Roboto"/>
+            </a:endParaRPr>
+          </a:p>
+        </p:txBody>
+      </p:sp>
+    </p:spTree>
+    <p:extLst>
+      <p:ext uri="{BB962C8B-B14F-4D97-AF65-F5344CB8AC3E}">
         <p14:creationId xmlns:p14="http://schemas.microsoft.com/office/powerpoint/2010/main" val="1930421405"/>
       </p:ext>
     </p:extLst>
@@ -5619,7 +5728,7 @@
 </p:sld>
 </file>
 
-<file path=ppt/slides/slide7.xml><?xml version="1.0" encoding="utf-8"?>
+<file path=ppt/slides/slide8.xml><?xml version="1.0" encoding="utf-8"?>
 <p:sld xmlns:a="http://schemas.openxmlformats.org/drawingml/2006/main" xmlns:r="http://schemas.openxmlformats.org/officeDocument/2006/relationships" xmlns:p="http://schemas.openxmlformats.org/presentationml/2006/main">
   <p:cSld>
     <p:spTree>

</xml_diff>

<commit_message>
adding interfaces and structs tutorial.
</commit_message>
<xml_diff>
--- a/assets/powerpoints/golang2.pptx
+++ b/assets/powerpoints/golang2.pptx
@@ -5,17 +5,19 @@
     <p:sldMasterId id="2147483648" r:id="rId1"/>
   </p:sldMasterIdLst>
   <p:notesMasterIdLst>
-    <p:notesMasterId r:id="rId10"/>
+    <p:notesMasterId r:id="rId12"/>
   </p:notesMasterIdLst>
   <p:sldIdLst>
     <p:sldId id="258" r:id="rId2"/>
-    <p:sldId id="262" r:id="rId3"/>
-    <p:sldId id="263" r:id="rId4"/>
-    <p:sldId id="259" r:id="rId5"/>
-    <p:sldId id="260" r:id="rId6"/>
-    <p:sldId id="265" r:id="rId7"/>
-    <p:sldId id="264" r:id="rId8"/>
-    <p:sldId id="261" r:id="rId9"/>
+    <p:sldId id="266" r:id="rId3"/>
+    <p:sldId id="262" r:id="rId4"/>
+    <p:sldId id="263" r:id="rId5"/>
+    <p:sldId id="267" r:id="rId6"/>
+    <p:sldId id="260" r:id="rId7"/>
+    <p:sldId id="259" r:id="rId8"/>
+    <p:sldId id="265" r:id="rId9"/>
+    <p:sldId id="264" r:id="rId10"/>
+    <p:sldId id="261" r:id="rId11"/>
   </p:sldIdLst>
   <p:sldSz cx="12192000" cy="6858000"/>
   <p:notesSz cx="6858000" cy="9144000"/>
@@ -216,7 +218,7 @@
           <a:p>
             <a:fld id="{AB412791-CB19-4B63-9963-8A77FB30904D}" type="datetimeFigureOut">
               <a:rPr lang="en-US" smtClean="0"/>
-              <a:t>4/12/2019</a:t>
+              <a:t>4/16/2019</a:t>
             </a:fld>
             <a:endParaRPr lang="en-US"/>
           </a:p>
@@ -530,157 +532,36 @@
           <a:p>
             <a:r>
               <a:rPr lang="en-US" dirty="0" smtClean="0"/>
-              <a:t>-</a:t>
-            </a:r>
-            <a:r>
-              <a:rPr lang="en-US" dirty="0" err="1" smtClean="0">
-                <a:latin typeface="Roboto"/>
-              </a:rPr>
-              <a:t>Golang</a:t>
-            </a:r>
-            <a:r>
-              <a:rPr lang="en-US" dirty="0" smtClean="0">
-                <a:latin typeface="Roboto"/>
-              </a:rPr>
-              <a:t> allows for multiple files under the same folder with the same package name. </a:t>
-            </a:r>
-          </a:p>
-          <a:p>
-            <a:r>
-              <a:rPr lang="en-US" dirty="0" smtClean="0">
-                <a:latin typeface="Roboto"/>
-              </a:rPr>
-              <a:t>-</a:t>
-            </a:r>
-            <a:r>
-              <a:rPr lang="en-US" dirty="0" err="1" smtClean="0">
-                <a:latin typeface="Roboto"/>
-              </a:rPr>
-              <a:t>Golang</a:t>
-            </a:r>
-            <a:r>
-              <a:rPr lang="en-US" dirty="0" smtClean="0">
-                <a:latin typeface="Roboto"/>
-              </a:rPr>
-              <a:t> does not allow for multiple package names under the same directory.</a:t>
-            </a:r>
-            <a:endParaRPr lang="en-US" dirty="0" smtClean="0"/>
-          </a:p>
-          <a:p>
-            <a:pPr marL="0" marR="0" lvl="0" indent="0" algn="l" defTabSz="914400" rtl="0" eaLnBrk="1" fontAlgn="auto" latinLnBrk="0" hangingPunct="1">
-              <a:lnSpc>
-                <a:spcPct val="100000"/>
-              </a:lnSpc>
-              <a:spcBef>
-                <a:spcPts val="0"/>
-              </a:spcBef>
-              <a:spcAft>
-                <a:spcPts val="0"/>
-              </a:spcAft>
-              <a:buClrTx/>
-              <a:buSzTx/>
-              <a:buFontTx/>
-              <a:buNone/>
-              <a:tabLst/>
-              <a:defRPr/>
-            </a:pPr>
-            <a:r>
-              <a:rPr lang="en-US" dirty="0" smtClean="0"/>
-              <a:t>-In other words </a:t>
-            </a:r>
-            <a:r>
-              <a:rPr lang="en-US" dirty="0" smtClean="0">
-                <a:latin typeface="Roboto"/>
-              </a:rPr>
-              <a:t>One package per directory.</a:t>
-            </a:r>
-          </a:p>
-          <a:p>
-            <a:pPr marL="0" indent="0">
-              <a:buFontTx/>
-              <a:buNone/>
-            </a:pPr>
-            <a:r>
-              <a:rPr lang="en-US" dirty="0" smtClean="0"/>
-              <a:t>-A</a:t>
+              <a:t>The</a:t>
             </a:r>
             <a:r>
               <a:rPr lang="en-US" baseline="0" dirty="0" smtClean="0"/>
-              <a:t> directory should only have one package main although it doesn’t throw a compilation error.</a:t>
-            </a:r>
-          </a:p>
-          <a:p>
-            <a:pPr marL="0" indent="0">
-              <a:buFontTx/>
-              <a:buNone/>
-            </a:pPr>
-            <a:endParaRPr lang="en-US" dirty="0" smtClean="0"/>
-          </a:p>
-          <a:p>
-            <a:pPr marL="0" indent="0">
-              <a:buFontTx/>
-              <a:buNone/>
-            </a:pPr>
-            <a:r>
-              <a:rPr lang="en-US" dirty="0" smtClean="0"/>
-              <a:t>Examples to cover: </a:t>
-            </a:r>
-            <a:r>
-              <a:rPr lang="en-US" dirty="0" err="1" smtClean="0"/>
-              <a:t>util</a:t>
-            </a:r>
-            <a:r>
-              <a:rPr lang="en-US" dirty="0" smtClean="0"/>
-              <a:t>, </a:t>
-            </a:r>
-            <a:r>
-              <a:rPr lang="en-US" dirty="0" err="1" smtClean="0"/>
-              <a:t>mathPackage</a:t>
-            </a:r>
-            <a:r>
-              <a:rPr lang="en-US" dirty="0" smtClean="0"/>
-              <a:t>, </a:t>
-            </a:r>
-            <a:r>
-              <a:rPr lang="en-US" dirty="0" err="1" smtClean="0"/>
-              <a:t>package_tutorial</a:t>
-            </a:r>
-            <a:endParaRPr lang="en-US" dirty="0" smtClean="0"/>
-          </a:p>
-          <a:p>
-            <a:pPr marL="0" indent="0">
-              <a:buFontTx/>
-              <a:buNone/>
-            </a:pPr>
-            <a:endParaRPr lang="en-US" dirty="0" smtClean="0"/>
-          </a:p>
-          <a:p>
-            <a:pPr marL="0" indent="0">
-              <a:buFontTx/>
-              <a:buNone/>
-            </a:pPr>
-            <a:r>
-              <a:rPr lang="en-US" dirty="0" err="1" smtClean="0"/>
-              <a:t>Package_tutorial</a:t>
-            </a:r>
+              <a:t> agenda today will cover 5 topics </a:t>
+            </a:r>
+          </a:p>
+          <a:p>
+            <a:endParaRPr lang="en-US" baseline="0" dirty="0" smtClean="0"/>
+          </a:p>
+          <a:p>
             <a:r>
               <a:rPr lang="en-US" baseline="0" dirty="0" smtClean="0"/>
-              <a:t> – The package tutorial uses 3 packages lets cover the first package util.</a:t>
-            </a:r>
-            <a:endParaRPr lang="en-US" dirty="0" smtClean="0"/>
-          </a:p>
-          <a:p>
-            <a:pPr marL="0" indent="0">
-              <a:buFontTx/>
-              <a:buNone/>
-            </a:pPr>
-            <a:r>
-              <a:rPr lang="en-US" dirty="0" err="1" smtClean="0"/>
-              <a:t>Util</a:t>
+              <a:t>Packages, pointers </a:t>
+            </a:r>
+            <a:r>
+              <a:rPr lang="en-US" baseline="0" dirty="0" err="1" smtClean="0"/>
+              <a:t>os</a:t>
             </a:r>
             <a:r>
               <a:rPr lang="en-US" baseline="0" dirty="0" smtClean="0"/>
-              <a:t> – By convention package names are named the same thing as the directory name.</a:t>
+              <a:t>/exec, delve the debugging tool and the variety of </a:t>
+            </a:r>
+            <a:r>
+              <a:rPr lang="en-US" baseline="0" dirty="0" err="1" smtClean="0"/>
+              <a:t>golang</a:t>
+            </a:r>
+            <a:r>
+              <a:rPr lang="en-US" baseline="0" dirty="0" smtClean="0"/>
+              <a:t> development frameworks.</a:t>
             </a:r>
             <a:endParaRPr lang="en-US" dirty="0"/>
           </a:p>
@@ -712,7 +593,7 @@
     </p:spTree>
     <p:extLst>
       <p:ext uri="{BB962C8B-B14F-4D97-AF65-F5344CB8AC3E}">
-        <p14:creationId xmlns:p14="http://schemas.microsoft.com/office/powerpoint/2010/main" val="693273919"/>
+        <p14:creationId xmlns:p14="http://schemas.microsoft.com/office/powerpoint/2010/main" val="2012999517"/>
       </p:ext>
     </p:extLst>
   </p:cSld>
@@ -768,47 +649,158 @@
           <a:p>
             <a:r>
               <a:rPr lang="en-US" dirty="0" smtClean="0"/>
-              <a:t>-Delve</a:t>
+              <a:t>-</a:t>
+            </a:r>
+            <a:r>
+              <a:rPr lang="en-US" dirty="0" err="1" smtClean="0">
+                <a:latin typeface="Roboto"/>
+              </a:rPr>
+              <a:t>Golang</a:t>
+            </a:r>
+            <a:r>
+              <a:rPr lang="en-US" dirty="0" smtClean="0">
+                <a:latin typeface="Roboto"/>
+              </a:rPr>
+              <a:t> allows for multiple files under the same folder with the same package name. </a:t>
+            </a:r>
+          </a:p>
+          <a:p>
+            <a:r>
+              <a:rPr lang="en-US" dirty="0" smtClean="0">
+                <a:latin typeface="Roboto"/>
+              </a:rPr>
+              <a:t>-</a:t>
+            </a:r>
+            <a:r>
+              <a:rPr lang="en-US" dirty="0" err="1" smtClean="0">
+                <a:latin typeface="Roboto"/>
+              </a:rPr>
+              <a:t>Golang</a:t>
+            </a:r>
+            <a:r>
+              <a:rPr lang="en-US" dirty="0" smtClean="0">
+                <a:latin typeface="Roboto"/>
+              </a:rPr>
+              <a:t> does not allow for multiple package names under the same directory.</a:t>
+            </a:r>
+            <a:endParaRPr lang="en-US" dirty="0" smtClean="0"/>
+          </a:p>
+          <a:p>
+            <a:pPr marL="0" marR="0" lvl="0" indent="0" algn="l" defTabSz="914400" rtl="0" eaLnBrk="1" fontAlgn="auto" latinLnBrk="0" hangingPunct="1">
+              <a:lnSpc>
+                <a:spcPct val="100000"/>
+              </a:lnSpc>
+              <a:spcBef>
+                <a:spcPts val="0"/>
+              </a:spcBef>
+              <a:spcAft>
+                <a:spcPts val="0"/>
+              </a:spcAft>
+              <a:buClrTx/>
+              <a:buSzTx/>
+              <a:buFontTx/>
+              <a:buNone/>
+              <a:tabLst/>
+              <a:defRPr/>
+            </a:pPr>
+            <a:r>
+              <a:rPr lang="en-US" dirty="0" smtClean="0"/>
+              <a:t>-In other words </a:t>
+            </a:r>
+            <a:r>
+              <a:rPr lang="en-US" dirty="0" smtClean="0">
+                <a:latin typeface="Roboto"/>
+              </a:rPr>
+              <a:t>One package per directory.</a:t>
+            </a:r>
+          </a:p>
+          <a:p>
+            <a:pPr marL="0" indent="0">
+              <a:buFontTx/>
+              <a:buNone/>
+            </a:pPr>
+            <a:r>
+              <a:rPr lang="en-US" dirty="0" smtClean="0"/>
+              <a:t>-A</a:t>
             </a:r>
             <a:r>
               <a:rPr lang="en-US" baseline="0" dirty="0" smtClean="0"/>
-              <a:t> is the most popular open source debugger for </a:t>
-            </a:r>
-            <a:r>
-              <a:rPr lang="en-US" baseline="0" dirty="0" err="1" smtClean="0"/>
-              <a:t>golang</a:t>
+              <a:t> directory should only have one package main although it doesn’t throw a compilation error.</a:t>
+            </a:r>
+          </a:p>
+          <a:p>
+            <a:pPr marL="0" indent="0">
+              <a:buFontTx/>
+              <a:buNone/>
+            </a:pPr>
+            <a:endParaRPr lang="en-US" dirty="0" smtClean="0"/>
+          </a:p>
+          <a:p>
+            <a:pPr marL="0" indent="0">
+              <a:buFontTx/>
+              <a:buNone/>
+            </a:pPr>
+            <a:r>
+              <a:rPr lang="en-US" dirty="0" smtClean="0"/>
+              <a:t>Examples to cover: </a:t>
+            </a:r>
+            <a:r>
+              <a:rPr lang="en-US" dirty="0" err="1" smtClean="0"/>
+              <a:t>util</a:t>
+            </a:r>
+            <a:r>
+              <a:rPr lang="en-US" dirty="0" smtClean="0"/>
+              <a:t>, </a:t>
+            </a:r>
+            <a:r>
+              <a:rPr lang="en-US" dirty="0" err="1" smtClean="0"/>
+              <a:t>mathPackage</a:t>
+            </a:r>
+            <a:r>
+              <a:rPr lang="en-US" dirty="0" smtClean="0"/>
+              <a:t>, </a:t>
+            </a:r>
+            <a:r>
+              <a:rPr lang="en-US" dirty="0" err="1" smtClean="0"/>
+              <a:t>package_tutorial</a:t>
+            </a:r>
+            <a:endParaRPr lang="en-US" dirty="0" smtClean="0"/>
+          </a:p>
+          <a:p>
+            <a:pPr marL="0" indent="0">
+              <a:buFontTx/>
+              <a:buNone/>
+            </a:pPr>
+            <a:endParaRPr lang="en-US" dirty="0" smtClean="0"/>
+          </a:p>
+          <a:p>
+            <a:pPr marL="0" indent="0">
+              <a:buFontTx/>
+              <a:buNone/>
+            </a:pPr>
+            <a:r>
+              <a:rPr lang="en-US" dirty="0" err="1" smtClean="0"/>
+              <a:t>Package_tutorial</a:t>
             </a:r>
             <a:r>
               <a:rPr lang="en-US" baseline="0" dirty="0" smtClean="0"/>
-              <a:t> programming language.</a:t>
-            </a:r>
-          </a:p>
-          <a:p>
+              <a:t> – The package tutorial uses 3 packages lets cover the first package util.</a:t>
+            </a:r>
+            <a:endParaRPr lang="en-US" dirty="0" smtClean="0"/>
+          </a:p>
+          <a:p>
+            <a:pPr marL="0" indent="0">
+              <a:buFontTx/>
+              <a:buNone/>
+            </a:pPr>
+            <a:r>
+              <a:rPr lang="en-US" dirty="0" err="1" smtClean="0"/>
+              <a:t>Util</a:t>
+            </a:r>
             <a:r>
               <a:rPr lang="en-US" baseline="0" dirty="0" smtClean="0"/>
-              <a:t>-The source code is hosted on </a:t>
-            </a:r>
-            <a:r>
-              <a:rPr lang="en-US" baseline="0" dirty="0" err="1" smtClean="0"/>
-              <a:t>github</a:t>
-            </a:r>
-            <a:r>
-              <a:rPr lang="en-US" baseline="0" dirty="0" smtClean="0"/>
-              <a:t>.</a:t>
-            </a:r>
-          </a:p>
-          <a:p>
-            <a:r>
-              <a:rPr lang="en-US" baseline="0" dirty="0" smtClean="0"/>
-              <a:t>-Let’s practice by debugging </a:t>
-            </a:r>
-            <a:r>
-              <a:rPr lang="en-US" baseline="0" dirty="0" err="1" smtClean="0"/>
-              <a:t>point.go</a:t>
-            </a:r>
-            <a:endParaRPr lang="en-US" baseline="0" dirty="0" smtClean="0"/>
-          </a:p>
-          <a:p>
+              <a:t> – By convention package names are named the same thing as the directory name.</a:t>
+            </a:r>
             <a:endParaRPr lang="en-US" dirty="0"/>
           </a:p>
         </p:txBody>
@@ -830,7 +822,7 @@
           <a:p>
             <a:fld id="{E7485AFA-8529-45AE-977F-998C2B043712}" type="slidenum">
               <a:rPr lang="en-US" smtClean="0"/>
-              <a:t>4</a:t>
+              <a:t>3</a:t>
             </a:fld>
             <a:endParaRPr lang="en-US"/>
           </a:p>
@@ -839,7 +831,7 @@
     </p:spTree>
     <p:extLst>
       <p:ext uri="{BB962C8B-B14F-4D97-AF65-F5344CB8AC3E}">
-        <p14:creationId xmlns:p14="http://schemas.microsoft.com/office/powerpoint/2010/main" val="37682927"/>
+        <p14:creationId xmlns:p14="http://schemas.microsoft.com/office/powerpoint/2010/main" val="693273919"/>
       </p:ext>
     </p:extLst>
   </p:cSld>
@@ -895,6 +887,236 @@
           <a:p>
             <a:r>
               <a:rPr lang="en-US" dirty="0" smtClean="0"/>
+              <a:t>-</a:t>
+            </a:r>
+            <a:r>
+              <a:rPr lang="en-US" dirty="0" err="1" smtClean="0"/>
+              <a:t>Golang</a:t>
+            </a:r>
+            <a:r>
+              <a:rPr lang="en-US" baseline="0" dirty="0" smtClean="0"/>
+              <a:t> is not a pure object oriented programming language. It does not provide classes.</a:t>
+            </a:r>
+          </a:p>
+          <a:p>
+            <a:endParaRPr lang="en-US" baseline="0" dirty="0" smtClean="0"/>
+          </a:p>
+          <a:p>
+            <a:endParaRPr lang="en-US" baseline="0" dirty="0" smtClean="0"/>
+          </a:p>
+          <a:p>
+            <a:r>
+              <a:rPr lang="en-US" baseline="0" dirty="0" smtClean="0"/>
+              <a:t>-Side notes:</a:t>
+            </a:r>
+          </a:p>
+          <a:p>
+            <a:r>
+              <a:rPr lang="en-US" dirty="0" smtClean="0"/>
+              <a:t>Yes and no. Although Go has types and methods and allows an object-oriented style of programming, there is no type hierarchy. The concept of “interface” in Go provides a different approach that we believe is easy to use and in some ways more general. There are also ways to embed types in other types to provide something analogous—but not identical—to </a:t>
+            </a:r>
+            <a:r>
+              <a:rPr lang="en-US" dirty="0" err="1" smtClean="0"/>
+              <a:t>subclassing</a:t>
+            </a:r>
+            <a:r>
+              <a:rPr lang="en-US" dirty="0" smtClean="0"/>
+              <a:t>. Moreover, methods in Go are more general than in C++ or Java: they can be defined for any sort of data, even built-in types such as plain, “unboxed” integers. They are not restricted to </a:t>
+            </a:r>
+            <a:r>
+              <a:rPr lang="en-US" dirty="0" err="1" smtClean="0"/>
+              <a:t>structs</a:t>
+            </a:r>
+            <a:r>
+              <a:rPr lang="en-US" dirty="0" smtClean="0"/>
+              <a:t> (classes). </a:t>
+            </a:r>
+            <a:r>
+              <a:rPr lang="en-US" baseline="0" dirty="0" smtClean="0"/>
+              <a:t> </a:t>
+            </a:r>
+            <a:endParaRPr lang="en-US" dirty="0"/>
+          </a:p>
+        </p:txBody>
+      </p:sp>
+      <p:sp>
+        <p:nvSpPr>
+          <p:cNvPr id="4" name="Slide Number Placeholder 3"/>
+          <p:cNvSpPr>
+            <a:spLocks noGrp="1"/>
+          </p:cNvSpPr>
+          <p:nvPr>
+            <p:ph type="sldNum" sz="quarter" idx="10"/>
+          </p:nvPr>
+        </p:nvSpPr>
+        <p:spPr/>
+        <p:txBody>
+          <a:bodyPr/>
+          <a:lstStyle/>
+          <a:p>
+            <a:fld id="{E7485AFA-8529-45AE-977F-998C2B043712}" type="slidenum">
+              <a:rPr lang="en-US" smtClean="0"/>
+              <a:t>4</a:t>
+            </a:fld>
+            <a:endParaRPr lang="en-US"/>
+          </a:p>
+        </p:txBody>
+      </p:sp>
+    </p:spTree>
+    <p:extLst>
+      <p:ext uri="{BB962C8B-B14F-4D97-AF65-F5344CB8AC3E}">
+        <p14:creationId xmlns:p14="http://schemas.microsoft.com/office/powerpoint/2010/main" val="3518995236"/>
+      </p:ext>
+    </p:extLst>
+  </p:cSld>
+  <p:clrMapOvr>
+    <a:masterClrMapping/>
+  </p:clrMapOvr>
+</p:notes>
+</file>
+
+<file path=ppt/notesSlides/notesSlide4.xml><?xml version="1.0" encoding="utf-8"?>
+<p:notes xmlns:a="http://schemas.openxmlformats.org/drawingml/2006/main" xmlns:r="http://schemas.openxmlformats.org/officeDocument/2006/relationships" xmlns:p="http://schemas.openxmlformats.org/presentationml/2006/main">
+  <p:cSld>
+    <p:spTree>
+      <p:nvGrpSpPr>
+        <p:cNvPr id="1" name=""/>
+        <p:cNvGrpSpPr/>
+        <p:nvPr/>
+      </p:nvGrpSpPr>
+      <p:grpSpPr>
+        <a:xfrm>
+          <a:off x="0" y="0"/>
+          <a:ext cx="0" cy="0"/>
+          <a:chOff x="0" y="0"/>
+          <a:chExt cx="0" cy="0"/>
+        </a:xfrm>
+      </p:grpSpPr>
+      <p:sp>
+        <p:nvSpPr>
+          <p:cNvPr id="2" name="Slide Image Placeholder 1"/>
+          <p:cNvSpPr>
+            <a:spLocks noGrp="1" noRot="1" noChangeAspect="1"/>
+          </p:cNvSpPr>
+          <p:nvPr>
+            <p:ph type="sldImg"/>
+          </p:nvPr>
+        </p:nvSpPr>
+        <p:spPr/>
+      </p:sp>
+      <p:sp>
+        <p:nvSpPr>
+          <p:cNvPr id="3" name="Notes Placeholder 2"/>
+          <p:cNvSpPr>
+            <a:spLocks noGrp="1"/>
+          </p:cNvSpPr>
+          <p:nvPr>
+            <p:ph type="body" idx="1"/>
+          </p:nvPr>
+        </p:nvSpPr>
+        <p:spPr/>
+        <p:txBody>
+          <a:bodyPr/>
+          <a:lstStyle/>
+          <a:p>
+            <a:r>
+              <a:rPr lang="en-US" dirty="0" smtClean="0"/>
+              <a:t>Lets</a:t>
+            </a:r>
+            <a:r>
+              <a:rPr lang="en-US" baseline="0" dirty="0" smtClean="0"/>
+              <a:t> take a look at </a:t>
+            </a:r>
+            <a:r>
+              <a:rPr lang="en-US" baseline="0" dirty="0" err="1" smtClean="0"/>
+              <a:t>shapes.go</a:t>
+            </a:r>
+            <a:endParaRPr lang="en-US" dirty="0"/>
+          </a:p>
+        </p:txBody>
+      </p:sp>
+      <p:sp>
+        <p:nvSpPr>
+          <p:cNvPr id="4" name="Slide Number Placeholder 3"/>
+          <p:cNvSpPr>
+            <a:spLocks noGrp="1"/>
+          </p:cNvSpPr>
+          <p:nvPr>
+            <p:ph type="sldNum" sz="quarter" idx="10"/>
+          </p:nvPr>
+        </p:nvSpPr>
+        <p:spPr/>
+        <p:txBody>
+          <a:bodyPr/>
+          <a:lstStyle/>
+          <a:p>
+            <a:fld id="{E7485AFA-8529-45AE-977F-998C2B043712}" type="slidenum">
+              <a:rPr lang="en-US" smtClean="0"/>
+              <a:t>5</a:t>
+            </a:fld>
+            <a:endParaRPr lang="en-US"/>
+          </a:p>
+        </p:txBody>
+      </p:sp>
+    </p:spTree>
+    <p:extLst>
+      <p:ext uri="{BB962C8B-B14F-4D97-AF65-F5344CB8AC3E}">
+        <p14:creationId xmlns:p14="http://schemas.microsoft.com/office/powerpoint/2010/main" val="1600146253"/>
+      </p:ext>
+    </p:extLst>
+  </p:cSld>
+  <p:clrMapOvr>
+    <a:masterClrMapping/>
+  </p:clrMapOvr>
+</p:notes>
+</file>
+
+<file path=ppt/notesSlides/notesSlide5.xml><?xml version="1.0" encoding="utf-8"?>
+<p:notes xmlns:a="http://schemas.openxmlformats.org/drawingml/2006/main" xmlns:r="http://schemas.openxmlformats.org/officeDocument/2006/relationships" xmlns:p="http://schemas.openxmlformats.org/presentationml/2006/main">
+  <p:cSld>
+    <p:spTree>
+      <p:nvGrpSpPr>
+        <p:cNvPr id="1" name=""/>
+        <p:cNvGrpSpPr/>
+        <p:nvPr/>
+      </p:nvGrpSpPr>
+      <p:grpSpPr>
+        <a:xfrm>
+          <a:off x="0" y="0"/>
+          <a:ext cx="0" cy="0"/>
+          <a:chOff x="0" y="0"/>
+          <a:chExt cx="0" cy="0"/>
+        </a:xfrm>
+      </p:grpSpPr>
+      <p:sp>
+        <p:nvSpPr>
+          <p:cNvPr id="2" name="Slide Image Placeholder 1"/>
+          <p:cNvSpPr>
+            <a:spLocks noGrp="1" noRot="1" noChangeAspect="1"/>
+          </p:cNvSpPr>
+          <p:nvPr>
+            <p:ph type="sldImg"/>
+          </p:nvPr>
+        </p:nvSpPr>
+        <p:spPr/>
+      </p:sp>
+      <p:sp>
+        <p:nvSpPr>
+          <p:cNvPr id="3" name="Notes Placeholder 2"/>
+          <p:cNvSpPr>
+            <a:spLocks noGrp="1"/>
+          </p:cNvSpPr>
+          <p:nvPr>
+            <p:ph type="body" idx="1"/>
+          </p:nvPr>
+        </p:nvSpPr>
+        <p:spPr/>
+        <p:txBody>
+          <a:bodyPr/>
+          <a:lstStyle/>
+          <a:p>
+            <a:r>
+              <a:rPr lang="en-US" dirty="0" smtClean="0"/>
               <a:t>Let’s discuss</a:t>
             </a:r>
             <a:r>
@@ -1142,7 +1364,7 @@
           <a:p>
             <a:fld id="{E7485AFA-8529-45AE-977F-998C2B043712}" type="slidenum">
               <a:rPr lang="en-US" smtClean="0"/>
-              <a:t>5</a:t>
+              <a:t>6</a:t>
             </a:fld>
             <a:endParaRPr lang="en-US"/>
           </a:p>
@@ -1152,6 +1374,133 @@
     <p:extLst>
       <p:ext uri="{BB962C8B-B14F-4D97-AF65-F5344CB8AC3E}">
         <p14:creationId xmlns:p14="http://schemas.microsoft.com/office/powerpoint/2010/main" val="3797484932"/>
+      </p:ext>
+    </p:extLst>
+  </p:cSld>
+  <p:clrMapOvr>
+    <a:masterClrMapping/>
+  </p:clrMapOvr>
+</p:notes>
+</file>
+
+<file path=ppt/notesSlides/notesSlide6.xml><?xml version="1.0" encoding="utf-8"?>
+<p:notes xmlns:a="http://schemas.openxmlformats.org/drawingml/2006/main" xmlns:r="http://schemas.openxmlformats.org/officeDocument/2006/relationships" xmlns:p="http://schemas.openxmlformats.org/presentationml/2006/main">
+  <p:cSld>
+    <p:spTree>
+      <p:nvGrpSpPr>
+        <p:cNvPr id="1" name=""/>
+        <p:cNvGrpSpPr/>
+        <p:nvPr/>
+      </p:nvGrpSpPr>
+      <p:grpSpPr>
+        <a:xfrm>
+          <a:off x="0" y="0"/>
+          <a:ext cx="0" cy="0"/>
+          <a:chOff x="0" y="0"/>
+          <a:chExt cx="0" cy="0"/>
+        </a:xfrm>
+      </p:grpSpPr>
+      <p:sp>
+        <p:nvSpPr>
+          <p:cNvPr id="2" name="Slide Image Placeholder 1"/>
+          <p:cNvSpPr>
+            <a:spLocks noGrp="1" noRot="1" noChangeAspect="1"/>
+          </p:cNvSpPr>
+          <p:nvPr>
+            <p:ph type="sldImg"/>
+          </p:nvPr>
+        </p:nvSpPr>
+        <p:spPr/>
+      </p:sp>
+      <p:sp>
+        <p:nvSpPr>
+          <p:cNvPr id="3" name="Notes Placeholder 2"/>
+          <p:cNvSpPr>
+            <a:spLocks noGrp="1"/>
+          </p:cNvSpPr>
+          <p:nvPr>
+            <p:ph type="body" idx="1"/>
+          </p:nvPr>
+        </p:nvSpPr>
+        <p:spPr/>
+        <p:txBody>
+          <a:bodyPr/>
+          <a:lstStyle/>
+          <a:p>
+            <a:r>
+              <a:rPr lang="en-US" dirty="0" smtClean="0"/>
+              <a:t>-Delve</a:t>
+            </a:r>
+            <a:r>
+              <a:rPr lang="en-US" baseline="0" dirty="0" smtClean="0"/>
+              <a:t> is the most popular open source debugger for </a:t>
+            </a:r>
+            <a:r>
+              <a:rPr lang="en-US" baseline="0" dirty="0" err="1" smtClean="0"/>
+              <a:t>golang</a:t>
+            </a:r>
+            <a:r>
+              <a:rPr lang="en-US" baseline="0" dirty="0" smtClean="0"/>
+              <a:t> programming language.</a:t>
+            </a:r>
+          </a:p>
+          <a:p>
+            <a:r>
+              <a:rPr lang="en-US" baseline="0" dirty="0" smtClean="0"/>
+              <a:t>-The source code is hosted on </a:t>
+            </a:r>
+            <a:r>
+              <a:rPr lang="en-US" baseline="0" dirty="0" err="1" smtClean="0"/>
+              <a:t>github</a:t>
+            </a:r>
+            <a:r>
+              <a:rPr lang="en-US" baseline="0" dirty="0" smtClean="0"/>
+              <a:t>.</a:t>
+            </a:r>
+          </a:p>
+          <a:p>
+            <a:r>
+              <a:rPr lang="en-US" baseline="0" dirty="0" smtClean="0"/>
+              <a:t>-Let’s practice by debugging </a:t>
+            </a:r>
+            <a:r>
+              <a:rPr lang="en-US" baseline="0" dirty="0" err="1" smtClean="0"/>
+              <a:t>point.go</a:t>
+            </a:r>
+            <a:endParaRPr lang="en-US" baseline="0" dirty="0" smtClean="0"/>
+          </a:p>
+          <a:p>
+            <a:endParaRPr lang="en-US" dirty="0"/>
+          </a:p>
+        </p:txBody>
+      </p:sp>
+      <p:sp>
+        <p:nvSpPr>
+          <p:cNvPr id="4" name="Slide Number Placeholder 3"/>
+          <p:cNvSpPr>
+            <a:spLocks noGrp="1"/>
+          </p:cNvSpPr>
+          <p:nvPr>
+            <p:ph type="sldNum" sz="quarter" idx="10"/>
+          </p:nvPr>
+        </p:nvSpPr>
+        <p:spPr/>
+        <p:txBody>
+          <a:bodyPr/>
+          <a:lstStyle/>
+          <a:p>
+            <a:fld id="{E7485AFA-8529-45AE-977F-998C2B043712}" type="slidenum">
+              <a:rPr lang="en-US" smtClean="0"/>
+              <a:t>7</a:t>
+            </a:fld>
+            <a:endParaRPr lang="en-US"/>
+          </a:p>
+        </p:txBody>
+      </p:sp>
+    </p:spTree>
+    <p:extLst>
+      <p:ext uri="{BB962C8B-B14F-4D97-AF65-F5344CB8AC3E}">
+        <p14:creationId xmlns:p14="http://schemas.microsoft.com/office/powerpoint/2010/main" val="37682927"/>
       </p:ext>
     </p:extLst>
   </p:cSld>
@@ -1292,7 +1641,7 @@
           <a:p>
             <a:fld id="{790ED757-B5C7-4A40-922E-B631E1D33579}" type="datetimeFigureOut">
               <a:rPr lang="en-US" smtClean="0"/>
-              <a:t>4/12/2019</a:t>
+              <a:t>4/16/2019</a:t>
             </a:fld>
             <a:endParaRPr lang="en-US"/>
           </a:p>
@@ -1462,7 +1811,7 @@
           <a:p>
             <a:fld id="{790ED757-B5C7-4A40-922E-B631E1D33579}" type="datetimeFigureOut">
               <a:rPr lang="en-US" smtClean="0"/>
-              <a:t>4/12/2019</a:t>
+              <a:t>4/16/2019</a:t>
             </a:fld>
             <a:endParaRPr lang="en-US"/>
           </a:p>
@@ -1642,7 +1991,7 @@
           <a:p>
             <a:fld id="{790ED757-B5C7-4A40-922E-B631E1D33579}" type="datetimeFigureOut">
               <a:rPr lang="en-US" smtClean="0"/>
-              <a:t>4/12/2019</a:t>
+              <a:t>4/16/2019</a:t>
             </a:fld>
             <a:endParaRPr lang="en-US"/>
           </a:p>
@@ -1812,7 +2161,7 @@
           <a:p>
             <a:fld id="{790ED757-B5C7-4A40-922E-B631E1D33579}" type="datetimeFigureOut">
               <a:rPr lang="en-US" smtClean="0"/>
-              <a:t>4/12/2019</a:t>
+              <a:t>4/16/2019</a:t>
             </a:fld>
             <a:endParaRPr lang="en-US"/>
           </a:p>
@@ -2058,7 +2407,7 @@
           <a:p>
             <a:fld id="{790ED757-B5C7-4A40-922E-B631E1D33579}" type="datetimeFigureOut">
               <a:rPr lang="en-US" smtClean="0"/>
-              <a:t>4/12/2019</a:t>
+              <a:t>4/16/2019</a:t>
             </a:fld>
             <a:endParaRPr lang="en-US"/>
           </a:p>
@@ -2290,7 +2639,7 @@
           <a:p>
             <a:fld id="{790ED757-B5C7-4A40-922E-B631E1D33579}" type="datetimeFigureOut">
               <a:rPr lang="en-US" smtClean="0"/>
-              <a:t>4/12/2019</a:t>
+              <a:t>4/16/2019</a:t>
             </a:fld>
             <a:endParaRPr lang="en-US"/>
           </a:p>
@@ -2657,7 +3006,7 @@
           <a:p>
             <a:fld id="{790ED757-B5C7-4A40-922E-B631E1D33579}" type="datetimeFigureOut">
               <a:rPr lang="en-US" smtClean="0"/>
-              <a:t>4/12/2019</a:t>
+              <a:t>4/16/2019</a:t>
             </a:fld>
             <a:endParaRPr lang="en-US"/>
           </a:p>
@@ -2775,7 +3124,7 @@
           <a:p>
             <a:fld id="{790ED757-B5C7-4A40-922E-B631E1D33579}" type="datetimeFigureOut">
               <a:rPr lang="en-US" smtClean="0"/>
-              <a:t>4/12/2019</a:t>
+              <a:t>4/16/2019</a:t>
             </a:fld>
             <a:endParaRPr lang="en-US"/>
           </a:p>
@@ -2870,7 +3219,7 @@
           <a:p>
             <a:fld id="{790ED757-B5C7-4A40-922E-B631E1D33579}" type="datetimeFigureOut">
               <a:rPr lang="en-US" smtClean="0"/>
-              <a:t>4/12/2019</a:t>
+              <a:t>4/16/2019</a:t>
             </a:fld>
             <a:endParaRPr lang="en-US"/>
           </a:p>
@@ -3147,7 +3496,7 @@
           <a:p>
             <a:fld id="{790ED757-B5C7-4A40-922E-B631E1D33579}" type="datetimeFigureOut">
               <a:rPr lang="en-US" smtClean="0"/>
-              <a:t>4/12/2019</a:t>
+              <a:t>4/16/2019</a:t>
             </a:fld>
             <a:endParaRPr lang="en-US"/>
           </a:p>
@@ -3400,7 +3749,7 @@
           <a:p>
             <a:fld id="{790ED757-B5C7-4A40-922E-B631E1D33579}" type="datetimeFigureOut">
               <a:rPr lang="en-US" smtClean="0"/>
-              <a:t>4/12/2019</a:t>
+              <a:t>4/16/2019</a:t>
             </a:fld>
             <a:endParaRPr lang="en-US"/>
           </a:p>
@@ -3613,7 +3962,7 @@
           <a:p>
             <a:fld id="{790ED757-B5C7-4A40-922E-B631E1D33579}" type="datetimeFigureOut">
               <a:rPr lang="en-US" smtClean="0"/>
-              <a:t>4/12/2019</a:t>
+              <a:t>4/16/2019</a:t>
             </a:fld>
             <a:endParaRPr lang="en-US"/>
           </a:p>
@@ -4079,7 +4428,227 @@
 </p:sld>
 </file>
 
+<file path=ppt/slides/slide10.xml><?xml version="1.0" encoding="utf-8"?>
+<p:sld xmlns:a="http://schemas.openxmlformats.org/drawingml/2006/main" xmlns:r="http://schemas.openxmlformats.org/officeDocument/2006/relationships" xmlns:p="http://schemas.openxmlformats.org/presentationml/2006/main">
+  <p:cSld>
+    <p:spTree>
+      <p:nvGrpSpPr>
+        <p:cNvPr id="1" name=""/>
+        <p:cNvGrpSpPr/>
+        <p:nvPr/>
+      </p:nvGrpSpPr>
+      <p:grpSpPr>
+        <a:xfrm>
+          <a:off x="0" y="0"/>
+          <a:ext cx="0" cy="0"/>
+          <a:chOff x="0" y="0"/>
+          <a:chExt cx="0" cy="0"/>
+        </a:xfrm>
+      </p:grpSpPr>
+      <p:sp>
+        <p:nvSpPr>
+          <p:cNvPr id="2" name="Title 1"/>
+          <p:cNvSpPr>
+            <a:spLocks noGrp="1"/>
+          </p:cNvSpPr>
+          <p:nvPr>
+            <p:ph type="title"/>
+          </p:nvPr>
+        </p:nvSpPr>
+        <p:spPr/>
+        <p:txBody>
+          <a:bodyPr/>
+          <a:lstStyle/>
+          <a:p>
+            <a:endParaRPr lang="en-US" dirty="0">
+              <a:latin typeface="Roboto"/>
+            </a:endParaRPr>
+          </a:p>
+        </p:txBody>
+      </p:sp>
+      <p:sp>
+        <p:nvSpPr>
+          <p:cNvPr id="3" name="Content Placeholder 2"/>
+          <p:cNvSpPr>
+            <a:spLocks noGrp="1"/>
+          </p:cNvSpPr>
+          <p:nvPr>
+            <p:ph idx="1"/>
+          </p:nvPr>
+        </p:nvSpPr>
+        <p:spPr/>
+        <p:txBody>
+          <a:bodyPr/>
+          <a:lstStyle/>
+          <a:p>
+            <a:endParaRPr lang="en-US" dirty="0">
+              <a:latin typeface="Roboto"/>
+            </a:endParaRPr>
+          </a:p>
+        </p:txBody>
+      </p:sp>
+    </p:spTree>
+    <p:extLst>
+      <p:ext uri="{BB962C8B-B14F-4D97-AF65-F5344CB8AC3E}">
+        <p14:creationId xmlns:p14="http://schemas.microsoft.com/office/powerpoint/2010/main" val="1863585274"/>
+      </p:ext>
+    </p:extLst>
+  </p:cSld>
+  <p:clrMapOvr>
+    <a:masterClrMapping/>
+  </p:clrMapOvr>
+</p:sld>
+</file>
+
 <file path=ppt/slides/slide2.xml><?xml version="1.0" encoding="utf-8"?>
+<p:sld xmlns:a="http://schemas.openxmlformats.org/drawingml/2006/main" xmlns:r="http://schemas.openxmlformats.org/officeDocument/2006/relationships" xmlns:p="http://schemas.openxmlformats.org/presentationml/2006/main">
+  <p:cSld>
+    <p:spTree>
+      <p:nvGrpSpPr>
+        <p:cNvPr id="1" name=""/>
+        <p:cNvGrpSpPr/>
+        <p:nvPr/>
+      </p:nvGrpSpPr>
+      <p:grpSpPr>
+        <a:xfrm>
+          <a:off x="0" y="0"/>
+          <a:ext cx="0" cy="0"/>
+          <a:chOff x="0" y="0"/>
+          <a:chExt cx="0" cy="0"/>
+        </a:xfrm>
+      </p:grpSpPr>
+      <p:sp>
+        <p:nvSpPr>
+          <p:cNvPr id="2" name="Title 1"/>
+          <p:cNvSpPr>
+            <a:spLocks noGrp="1"/>
+          </p:cNvSpPr>
+          <p:nvPr>
+            <p:ph type="title"/>
+          </p:nvPr>
+        </p:nvSpPr>
+        <p:spPr/>
+        <p:txBody>
+          <a:bodyPr/>
+          <a:lstStyle/>
+          <a:p>
+            <a:r>
+              <a:rPr lang="en-US" dirty="0" smtClean="0">
+                <a:latin typeface="Roboto"/>
+              </a:rPr>
+              <a:t>Agenda</a:t>
+            </a:r>
+            <a:endParaRPr lang="en-US" dirty="0">
+              <a:latin typeface="Roboto"/>
+            </a:endParaRPr>
+          </a:p>
+        </p:txBody>
+      </p:sp>
+      <p:sp>
+        <p:nvSpPr>
+          <p:cNvPr id="3" name="Content Placeholder 2"/>
+          <p:cNvSpPr>
+            <a:spLocks noGrp="1"/>
+          </p:cNvSpPr>
+          <p:nvPr>
+            <p:ph idx="1"/>
+          </p:nvPr>
+        </p:nvSpPr>
+        <p:spPr/>
+        <p:txBody>
+          <a:bodyPr/>
+          <a:lstStyle/>
+          <a:p>
+            <a:r>
+              <a:rPr lang="en-US" dirty="0" smtClean="0">
+                <a:latin typeface="Roboto"/>
+              </a:rPr>
+              <a:t>Packages</a:t>
+            </a:r>
+          </a:p>
+          <a:p>
+            <a:r>
+              <a:rPr lang="en-US" dirty="0" err="1" smtClean="0">
+                <a:latin typeface="Roboto"/>
+              </a:rPr>
+              <a:t>Structs</a:t>
+            </a:r>
+            <a:endParaRPr lang="en-US" dirty="0" smtClean="0">
+              <a:latin typeface="Roboto"/>
+            </a:endParaRPr>
+          </a:p>
+          <a:p>
+            <a:r>
+              <a:rPr lang="en-US" dirty="0" smtClean="0">
+                <a:latin typeface="Roboto"/>
+              </a:rPr>
+              <a:t>Interfaces</a:t>
+            </a:r>
+          </a:p>
+          <a:p>
+            <a:r>
+              <a:rPr lang="en-US" dirty="0" err="1" smtClean="0">
+                <a:latin typeface="Roboto"/>
+              </a:rPr>
+              <a:t>os</a:t>
+            </a:r>
+            <a:r>
+              <a:rPr lang="en-US" dirty="0" smtClean="0">
+                <a:latin typeface="Roboto"/>
+              </a:rPr>
+              <a:t>/exec</a:t>
+            </a:r>
+          </a:p>
+          <a:p>
+            <a:r>
+              <a:rPr lang="en-US" dirty="0" smtClean="0">
+                <a:latin typeface="Roboto"/>
+              </a:rPr>
+              <a:t>Delve – Debugging </a:t>
+            </a:r>
+            <a:r>
+              <a:rPr lang="en-US" dirty="0" err="1" smtClean="0">
+                <a:latin typeface="Roboto"/>
+              </a:rPr>
+              <a:t>point.go</a:t>
+            </a:r>
+            <a:endParaRPr lang="en-US" dirty="0" smtClean="0">
+              <a:latin typeface="Roboto"/>
+            </a:endParaRPr>
+          </a:p>
+          <a:p>
+            <a:r>
+              <a:rPr lang="en-US" dirty="0" err="1" smtClean="0">
+                <a:latin typeface="Roboto"/>
+              </a:rPr>
+              <a:t>Golang</a:t>
+            </a:r>
+            <a:r>
+              <a:rPr lang="en-US" dirty="0" smtClean="0">
+                <a:latin typeface="Roboto"/>
+              </a:rPr>
+              <a:t> Development Frameworks</a:t>
+            </a:r>
+            <a:endParaRPr lang="en-US" dirty="0">
+              <a:latin typeface="Roboto"/>
+            </a:endParaRPr>
+          </a:p>
+        </p:txBody>
+      </p:sp>
+    </p:spTree>
+    <p:extLst>
+      <p:ext uri="{BB962C8B-B14F-4D97-AF65-F5344CB8AC3E}">
+        <p14:creationId xmlns:p14="http://schemas.microsoft.com/office/powerpoint/2010/main" val="386447707"/>
+      </p:ext>
+    </p:extLst>
+  </p:cSld>
+  <p:clrMapOvr>
+    <a:masterClrMapping/>
+  </p:clrMapOvr>
+</p:sld>
+</file>
+
+<file path=ppt/slides/slide3.xml><?xml version="1.0" encoding="utf-8"?>
 <p:sld xmlns:a="http://schemas.openxmlformats.org/drawingml/2006/main" xmlns:r="http://schemas.openxmlformats.org/officeDocument/2006/relationships" xmlns:p="http://schemas.openxmlformats.org/presentationml/2006/main">
   <p:cSld>
     <p:spTree>
@@ -4635,84 +5204,6 @@
 </p:sld>
 </file>
 
-<file path=ppt/slides/slide3.xml><?xml version="1.0" encoding="utf-8"?>
-<p:sld xmlns:a="http://schemas.openxmlformats.org/drawingml/2006/main" xmlns:r="http://schemas.openxmlformats.org/officeDocument/2006/relationships" xmlns:p="http://schemas.openxmlformats.org/presentationml/2006/main">
-  <p:cSld>
-    <p:spTree>
-      <p:nvGrpSpPr>
-        <p:cNvPr id="1" name=""/>
-        <p:cNvGrpSpPr/>
-        <p:nvPr/>
-      </p:nvGrpSpPr>
-      <p:grpSpPr>
-        <a:xfrm>
-          <a:off x="0" y="0"/>
-          <a:ext cx="0" cy="0"/>
-          <a:chOff x="0" y="0"/>
-          <a:chExt cx="0" cy="0"/>
-        </a:xfrm>
-      </p:grpSpPr>
-      <p:sp>
-        <p:nvSpPr>
-          <p:cNvPr id="2" name="Title 1"/>
-          <p:cNvSpPr>
-            <a:spLocks noGrp="1"/>
-          </p:cNvSpPr>
-          <p:nvPr>
-            <p:ph type="title"/>
-          </p:nvPr>
-        </p:nvSpPr>
-        <p:spPr/>
-        <p:txBody>
-          <a:bodyPr/>
-          <a:lstStyle/>
-          <a:p>
-            <a:r>
-              <a:rPr lang="en-US" dirty="0" smtClean="0">
-                <a:latin typeface="Roboto"/>
-              </a:rPr>
-              <a:t>Pointers</a:t>
-            </a:r>
-            <a:endParaRPr lang="en-US" dirty="0">
-              <a:latin typeface="Roboto"/>
-            </a:endParaRPr>
-          </a:p>
-        </p:txBody>
-      </p:sp>
-      <p:sp>
-        <p:nvSpPr>
-          <p:cNvPr id="3" name="Content Placeholder 2"/>
-          <p:cNvSpPr>
-            <a:spLocks noGrp="1"/>
-          </p:cNvSpPr>
-          <p:nvPr>
-            <p:ph idx="1"/>
-          </p:nvPr>
-        </p:nvSpPr>
-        <p:spPr/>
-        <p:txBody>
-          <a:bodyPr/>
-          <a:lstStyle/>
-          <a:p>
-            <a:endParaRPr lang="en-US" dirty="0">
-              <a:latin typeface="Roboto"/>
-            </a:endParaRPr>
-          </a:p>
-        </p:txBody>
-      </p:sp>
-    </p:spTree>
-    <p:extLst>
-      <p:ext uri="{BB962C8B-B14F-4D97-AF65-F5344CB8AC3E}">
-        <p14:creationId xmlns:p14="http://schemas.microsoft.com/office/powerpoint/2010/main" val="3588562914"/>
-      </p:ext>
-    </p:extLst>
-  </p:cSld>
-  <p:clrMapOvr>
-    <a:masterClrMapping/>
-  </p:clrMapOvr>
-</p:sld>
-</file>
-
 <file path=ppt/slides/slide4.xml><?xml version="1.0" encoding="utf-8"?>
 <p:sld xmlns:a="http://schemas.openxmlformats.org/drawingml/2006/main" xmlns:r="http://schemas.openxmlformats.org/officeDocument/2006/relationships" xmlns:p="http://schemas.openxmlformats.org/presentationml/2006/main">
   <p:cSld>
@@ -4746,10 +5237,10 @@
           <a:lstStyle/>
           <a:p>
             <a:r>
-              <a:rPr lang="en-US" dirty="0" smtClean="0">
+              <a:rPr lang="en-US" dirty="0" err="1" smtClean="0">
                 <a:latin typeface="Roboto"/>
               </a:rPr>
-              <a:t>Delve</a:t>
+              <a:t>Structs</a:t>
             </a:r>
             <a:endParaRPr lang="en-US" dirty="0">
               <a:latin typeface="Roboto"/>
@@ -4773,73 +5264,95 @@
           <a:lstStyle/>
           <a:p>
             <a:r>
+              <a:rPr lang="en-US" dirty="0" err="1" smtClean="0">
+                <a:latin typeface="Roboto"/>
+              </a:rPr>
+              <a:t>Golang</a:t>
+            </a:r>
+            <a:r>
               <a:rPr lang="en-US" dirty="0" smtClean="0">
                 <a:latin typeface="Roboto"/>
               </a:rPr>
-              <a:t>Delve the debugger for </a:t>
-            </a:r>
-            <a:r>
-              <a:rPr lang="en-US" dirty="0" err="1" smtClean="0">
-                <a:latin typeface="Roboto"/>
-              </a:rPr>
-              <a:t>Golang</a:t>
-            </a:r>
-            <a:endParaRPr lang="en-US" dirty="0" smtClean="0">
+              <a:t> allows for an object orient style of programming.</a:t>
+            </a:r>
+          </a:p>
+          <a:p>
+            <a:endParaRPr lang="en-US" dirty="0">
               <a:latin typeface="Roboto"/>
             </a:endParaRPr>
           </a:p>
           <a:p>
             <a:r>
               <a:rPr lang="en-US" dirty="0" smtClean="0">
-                <a:hlinkClick r:id="rId3"/>
-              </a:rPr>
-              <a:t>https://github.com/go-delve/d</a:t>
-            </a:r>
-          </a:p>
-          <a:p>
+                <a:latin typeface="Roboto"/>
+              </a:rPr>
+              <a:t>A </a:t>
+            </a:r>
+            <a:r>
+              <a:rPr lang="en-US" b="1" dirty="0" err="1" smtClean="0">
+                <a:latin typeface="Roboto"/>
+              </a:rPr>
+              <a:t>struct</a:t>
+            </a:r>
+            <a:r>
+              <a:rPr lang="en-US" b="1" dirty="0" smtClean="0">
+                <a:latin typeface="Roboto"/>
+              </a:rPr>
+              <a:t> </a:t>
+            </a:r>
             <a:r>
               <a:rPr lang="en-US" dirty="0" smtClean="0">
                 <a:latin typeface="Roboto"/>
               </a:rPr>
-              <a:t>Debugging </a:t>
-            </a:r>
-            <a:r>
-              <a:rPr lang="en-US" dirty="0" err="1" smtClean="0">
-                <a:latin typeface="Roboto"/>
-              </a:rPr>
-              <a:t>point.go</a:t>
-            </a:r>
-            <a:endParaRPr lang="en-US" dirty="0" smtClean="0">
+              <a:t>is a collection of fields.</a:t>
+            </a:r>
+          </a:p>
+          <a:p>
+            <a:endParaRPr lang="en-US" b="1" dirty="0">
               <a:latin typeface="Roboto"/>
             </a:endParaRPr>
           </a:p>
           <a:p>
-            <a:pPr marL="0" indent="0">
-              <a:buNone/>
-            </a:pPr>
-            <a:endParaRPr lang="en-US" dirty="0" smtClean="0">
+            <a:endParaRPr lang="en-US" b="1" dirty="0">
               <a:latin typeface="Roboto"/>
             </a:endParaRPr>
           </a:p>
         </p:txBody>
       </p:sp>
+      <p:pic>
+        <p:nvPicPr>
+          <p:cNvPr id="5" name="Picture 4"/>
+          <p:cNvPicPr>
+            <a:picLocks noChangeAspect="1"/>
+          </p:cNvPicPr>
+          <p:nvPr/>
+        </p:nvPicPr>
+        <p:blipFill>
+          <a:blip r:embed="rId3"/>
+          <a:stretch>
+            <a:fillRect/>
+          </a:stretch>
+        </p:blipFill>
+        <p:spPr>
+          <a:xfrm>
+            <a:off x="6807506" y="2313542"/>
+            <a:ext cx="5384494" cy="4544458"/>
+          </a:xfrm>
+          <a:prstGeom prst="rect">
+            <a:avLst/>
+          </a:prstGeom>
+        </p:spPr>
+      </p:pic>
     </p:spTree>
     <p:extLst>
       <p:ext uri="{BB962C8B-B14F-4D97-AF65-F5344CB8AC3E}">
-        <p14:creationId xmlns:p14="http://schemas.microsoft.com/office/powerpoint/2010/main" val="3973462481"/>
+        <p14:creationId xmlns:p14="http://schemas.microsoft.com/office/powerpoint/2010/main" val="3588562914"/>
       </p:ext>
     </p:extLst>
   </p:cSld>
   <p:clrMapOvr>
     <a:masterClrMapping/>
   </p:clrMapOvr>
-  <p:timing>
-    <p:tnLst>
-      <p:par>
-        <p:cTn id="1" dur="indefinite" restart="never" nodeType="tmRoot"/>
-      </p:par>
-    </p:tnLst>
-  </p:timing>
 </p:sld>
 </file>
 
@@ -4876,6 +5389,164 @@
           <a:lstStyle/>
           <a:p>
             <a:r>
+              <a:rPr lang="en-US" dirty="0" smtClean="0">
+                <a:latin typeface="Roboto"/>
+              </a:rPr>
+              <a:t>Interfaces</a:t>
+            </a:r>
+            <a:endParaRPr lang="en-US" dirty="0">
+              <a:latin typeface="Roboto"/>
+            </a:endParaRPr>
+          </a:p>
+        </p:txBody>
+      </p:sp>
+      <p:sp>
+        <p:nvSpPr>
+          <p:cNvPr id="3" name="Content Placeholder 2"/>
+          <p:cNvSpPr>
+            <a:spLocks noGrp="1"/>
+          </p:cNvSpPr>
+          <p:nvPr>
+            <p:ph idx="1"/>
+          </p:nvPr>
+        </p:nvSpPr>
+        <p:spPr/>
+        <p:txBody>
+          <a:bodyPr/>
+          <a:lstStyle/>
+          <a:p>
+            <a:r>
+              <a:rPr lang="en-US" dirty="0">
+                <a:latin typeface="Roboto"/>
+              </a:rPr>
+              <a:t>An </a:t>
+            </a:r>
+            <a:r>
+              <a:rPr lang="en-US" i="1" dirty="0">
+                <a:latin typeface="Roboto"/>
+              </a:rPr>
+              <a:t>interface type</a:t>
+            </a:r>
+            <a:r>
+              <a:rPr lang="en-US" dirty="0">
+                <a:latin typeface="Roboto"/>
+              </a:rPr>
+              <a:t> is defined as a set of method signatures</a:t>
+            </a:r>
+            <a:r>
+              <a:rPr lang="en-US" dirty="0" smtClean="0">
+                <a:latin typeface="Roboto"/>
+              </a:rPr>
+              <a:t>.</a:t>
+            </a:r>
+          </a:p>
+          <a:p>
+            <a:endParaRPr lang="en-US" dirty="0">
+              <a:latin typeface="Roboto"/>
+            </a:endParaRPr>
+          </a:p>
+          <a:p>
+            <a:r>
+              <a:rPr lang="en-US" dirty="0" smtClean="0">
+                <a:latin typeface="Roboto"/>
+              </a:rPr>
+              <a:t>Example:</a:t>
+            </a:r>
+          </a:p>
+          <a:p>
+            <a:pPr marL="0" indent="0">
+              <a:buNone/>
+            </a:pPr>
+            <a:r>
+              <a:rPr lang="en-US" dirty="0" smtClean="0">
+                <a:latin typeface="Roboto"/>
+              </a:rPr>
+              <a:t>	</a:t>
+            </a:r>
+            <a:r>
+              <a:rPr lang="en-US" dirty="0" err="1" smtClean="0">
+                <a:latin typeface="Roboto"/>
+              </a:rPr>
+              <a:t>Sha</a:t>
+            </a:r>
+            <a:r>
+              <a:rPr lang="en-US" dirty="0" err="1" smtClean="0">
+                <a:latin typeface="Roboto"/>
+              </a:rPr>
+              <a:t>pes.</a:t>
+            </a:r>
+            <a:r>
+              <a:rPr lang="en-US" dirty="0" err="1" smtClean="0">
+                <a:solidFill>
+                  <a:srgbClr val="00B0F0"/>
+                </a:solidFill>
+                <a:latin typeface="Roboto"/>
+              </a:rPr>
+              <a:t>go</a:t>
+            </a:r>
+            <a:endParaRPr lang="en-US" dirty="0">
+              <a:solidFill>
+                <a:srgbClr val="00B0F0"/>
+              </a:solidFill>
+              <a:latin typeface="Roboto"/>
+            </a:endParaRPr>
+          </a:p>
+          <a:p>
+            <a:pPr marL="0" indent="0">
+              <a:buNone/>
+            </a:pPr>
+            <a:endParaRPr lang="en-US" dirty="0">
+              <a:latin typeface="Roboto"/>
+            </a:endParaRPr>
+          </a:p>
+        </p:txBody>
+      </p:sp>
+    </p:spTree>
+    <p:extLst>
+      <p:ext uri="{BB962C8B-B14F-4D97-AF65-F5344CB8AC3E}">
+        <p14:creationId xmlns:p14="http://schemas.microsoft.com/office/powerpoint/2010/main" val="3316596055"/>
+      </p:ext>
+    </p:extLst>
+  </p:cSld>
+  <p:clrMapOvr>
+    <a:masterClrMapping/>
+  </p:clrMapOvr>
+</p:sld>
+</file>
+
+<file path=ppt/slides/slide6.xml><?xml version="1.0" encoding="utf-8"?>
+<p:sld xmlns:a="http://schemas.openxmlformats.org/drawingml/2006/main" xmlns:r="http://schemas.openxmlformats.org/officeDocument/2006/relationships" xmlns:p="http://schemas.openxmlformats.org/presentationml/2006/main">
+  <p:cSld>
+    <p:spTree>
+      <p:nvGrpSpPr>
+        <p:cNvPr id="1" name=""/>
+        <p:cNvGrpSpPr/>
+        <p:nvPr/>
+      </p:nvGrpSpPr>
+      <p:grpSpPr>
+        <a:xfrm>
+          <a:off x="0" y="0"/>
+          <a:ext cx="0" cy="0"/>
+          <a:chOff x="0" y="0"/>
+          <a:chExt cx="0" cy="0"/>
+        </a:xfrm>
+      </p:grpSpPr>
+      <p:sp>
+        <p:nvSpPr>
+          <p:cNvPr id="2" name="Title 1"/>
+          <p:cNvSpPr>
+            <a:spLocks noGrp="1"/>
+          </p:cNvSpPr>
+          <p:nvPr>
+            <p:ph type="title"/>
+          </p:nvPr>
+        </p:nvSpPr>
+        <p:spPr/>
+        <p:txBody>
+          <a:bodyPr/>
+          <a:lstStyle/>
+          <a:p>
+            <a:r>
               <a:rPr lang="en-US" dirty="0" err="1">
                 <a:latin typeface="Roboto"/>
               </a:rPr>
@@ -4966,9 +5637,21 @@
               <a:rPr lang="en-US" dirty="0" err="1" smtClean="0">
                 <a:latin typeface="Roboto"/>
               </a:rPr>
-              <a:t>date.go</a:t>
-            </a:r>
-            <a:endParaRPr lang="en-US" dirty="0" smtClean="0">
+              <a:t>date.</a:t>
+            </a:r>
+            <a:r>
+              <a:rPr lang="en-US" dirty="0" err="1" smtClean="0">
+                <a:solidFill>
+                  <a:srgbClr val="00B0F0"/>
+                </a:solidFill>
+                <a:latin typeface="Roboto"/>
+              </a:rPr>
+              <a:t>go</a:t>
+            </a:r>
+            <a:endParaRPr lang="en-US" dirty="0">
+              <a:solidFill>
+                <a:srgbClr val="00B0F0"/>
+              </a:solidFill>
               <a:latin typeface="Roboto"/>
             </a:endParaRPr>
           </a:p>
@@ -4977,9 +5660,21 @@
               <a:rPr lang="en-US" dirty="0" err="1" smtClean="0">
                 <a:latin typeface="Roboto"/>
               </a:rPr>
-              <a:t>ls.go</a:t>
+              <a:t>ls.</a:t>
+            </a:r>
+            <a:r>
+              <a:rPr lang="en-US" dirty="0" err="1" smtClean="0">
+                <a:solidFill>
+                  <a:srgbClr val="00B0F0"/>
+                </a:solidFill>
+                <a:latin typeface="Roboto"/>
+              </a:rPr>
+              <a:t>go</a:t>
             </a:r>
             <a:endParaRPr lang="en-US" dirty="0" smtClean="0">
+              <a:solidFill>
+                <a:srgbClr val="00B0F0"/>
+              </a:solidFill>
               <a:latin typeface="Roboto"/>
             </a:endParaRPr>
           </a:p>
@@ -5584,78 +6279,6 @@
 </p:sld>
 </file>
 
-<file path=ppt/slides/slide6.xml><?xml version="1.0" encoding="utf-8"?>
-<p:sld xmlns:a="http://schemas.openxmlformats.org/drawingml/2006/main" xmlns:r="http://schemas.openxmlformats.org/officeDocument/2006/relationships" xmlns:p="http://schemas.openxmlformats.org/presentationml/2006/main">
-  <p:cSld>
-    <p:spTree>
-      <p:nvGrpSpPr>
-        <p:cNvPr id="1" name=""/>
-        <p:cNvGrpSpPr/>
-        <p:nvPr/>
-      </p:nvGrpSpPr>
-      <p:grpSpPr>
-        <a:xfrm>
-          <a:off x="0" y="0"/>
-          <a:ext cx="0" cy="0"/>
-          <a:chOff x="0" y="0"/>
-          <a:chExt cx="0" cy="0"/>
-        </a:xfrm>
-      </p:grpSpPr>
-      <p:sp>
-        <p:nvSpPr>
-          <p:cNvPr id="2" name="Title 1"/>
-          <p:cNvSpPr>
-            <a:spLocks noGrp="1"/>
-          </p:cNvSpPr>
-          <p:nvPr>
-            <p:ph type="title"/>
-          </p:nvPr>
-        </p:nvSpPr>
-        <p:spPr/>
-        <p:txBody>
-          <a:bodyPr/>
-          <a:lstStyle/>
-          <a:p>
-            <a:endParaRPr lang="en-US" dirty="0">
-              <a:latin typeface="Roboto"/>
-            </a:endParaRPr>
-          </a:p>
-        </p:txBody>
-      </p:sp>
-      <p:sp>
-        <p:nvSpPr>
-          <p:cNvPr id="3" name="Content Placeholder 2"/>
-          <p:cNvSpPr>
-            <a:spLocks noGrp="1"/>
-          </p:cNvSpPr>
-          <p:nvPr>
-            <p:ph idx="1"/>
-          </p:nvPr>
-        </p:nvSpPr>
-        <p:spPr/>
-        <p:txBody>
-          <a:bodyPr/>
-          <a:lstStyle/>
-          <a:p>
-            <a:endParaRPr lang="en-US" dirty="0">
-              <a:latin typeface="Roboto"/>
-            </a:endParaRPr>
-          </a:p>
-        </p:txBody>
-      </p:sp>
-    </p:spTree>
-    <p:extLst>
-      <p:ext uri="{BB962C8B-B14F-4D97-AF65-F5344CB8AC3E}">
-        <p14:creationId xmlns:p14="http://schemas.microsoft.com/office/powerpoint/2010/main" val="1390304271"/>
-      </p:ext>
-    </p:extLst>
-  </p:cSld>
-  <p:clrMapOvr>
-    <a:masterClrMapping/>
-  </p:clrMapOvr>
-</p:sld>
-</file>
-
 <file path=ppt/slides/slide7.xml><?xml version="1.0" encoding="utf-8"?>
 <p:sld xmlns:a="http://schemas.openxmlformats.org/drawingml/2006/main" xmlns:r="http://schemas.openxmlformats.org/officeDocument/2006/relationships" xmlns:p="http://schemas.openxmlformats.org/presentationml/2006/main">
   <p:cSld>
@@ -5688,6 +6311,12 @@
           <a:bodyPr/>
           <a:lstStyle/>
           <a:p>
+            <a:r>
+              <a:rPr lang="en-US" dirty="0" smtClean="0">
+                <a:latin typeface="Roboto"/>
+              </a:rPr>
+              <a:t>Delve</a:t>
+            </a:r>
             <a:endParaRPr lang="en-US" dirty="0">
               <a:latin typeface="Roboto"/>
             </a:endParaRPr>
@@ -5709,7 +6338,52 @@
           <a:bodyPr/>
           <a:lstStyle/>
           <a:p>
-            <a:endParaRPr lang="en-US" dirty="0">
+            <a:r>
+              <a:rPr lang="en-US" dirty="0" smtClean="0">
+                <a:latin typeface="Roboto"/>
+              </a:rPr>
+              <a:t>Delve the debugger for </a:t>
+            </a:r>
+            <a:r>
+              <a:rPr lang="en-US" dirty="0" err="1" smtClean="0">
+                <a:latin typeface="Roboto"/>
+              </a:rPr>
+              <a:t>Golang</a:t>
+            </a:r>
+            <a:endParaRPr lang="en-US" dirty="0" smtClean="0">
+              <a:latin typeface="Roboto"/>
+            </a:endParaRPr>
+          </a:p>
+          <a:p>
+            <a:r>
+              <a:rPr lang="en-US" dirty="0" smtClean="0">
+                <a:hlinkClick r:id="rId3"/>
+              </a:rPr>
+              <a:t>https://github.com/go-delve/d</a:t>
+            </a:r>
+          </a:p>
+          <a:p>
+            <a:r>
+              <a:rPr lang="en-US" dirty="0" smtClean="0">
+                <a:latin typeface="Roboto"/>
+              </a:rPr>
+              <a:t>Debugging </a:t>
+            </a:r>
+            <a:r>
+              <a:rPr lang="en-US" dirty="0" err="1" smtClean="0">
+                <a:latin typeface="Roboto"/>
+              </a:rPr>
+              <a:t>point.go</a:t>
+            </a:r>
+            <a:endParaRPr lang="en-US" dirty="0" smtClean="0">
+              <a:latin typeface="Roboto"/>
+            </a:endParaRPr>
+          </a:p>
+          <a:p>
+            <a:pPr marL="0" indent="0">
+              <a:buNone/>
+            </a:pPr>
+            <a:endParaRPr lang="en-US" dirty="0" smtClean="0">
               <a:latin typeface="Roboto"/>
             </a:endParaRPr>
           </a:p>
@@ -5718,13 +6392,20 @@
     </p:spTree>
     <p:extLst>
       <p:ext uri="{BB962C8B-B14F-4D97-AF65-F5344CB8AC3E}">
-        <p14:creationId xmlns:p14="http://schemas.microsoft.com/office/powerpoint/2010/main" val="1930421405"/>
+        <p14:creationId xmlns:p14="http://schemas.microsoft.com/office/powerpoint/2010/main" val="3973462481"/>
       </p:ext>
     </p:extLst>
   </p:cSld>
   <p:clrMapOvr>
     <a:masterClrMapping/>
   </p:clrMapOvr>
+  <p:timing>
+    <p:tnLst>
+      <p:par>
+        <p:cTn id="1" dur="indefinite" restart="never" nodeType="tmRoot"/>
+      </p:par>
+    </p:tnLst>
+  </p:timing>
 </p:sld>
 </file>
 
@@ -5760,6 +6441,24 @@
           <a:bodyPr/>
           <a:lstStyle/>
           <a:p>
+            <a:r>
+              <a:rPr lang="en-US" dirty="0" err="1" smtClean="0">
+                <a:latin typeface="Roboto"/>
+              </a:rPr>
+              <a:t>Golang</a:t>
+            </a:r>
+            <a:r>
+              <a:rPr lang="en-US" dirty="0" smtClean="0">
+                <a:latin typeface="Roboto"/>
+              </a:rPr>
+              <a:t> Develo</a:t>
+            </a:r>
+            <a:r>
+              <a:rPr lang="en-US" dirty="0" smtClean="0">
+                <a:latin typeface="Roboto"/>
+              </a:rPr>
+              <a:t>pment Frameworks</a:t>
+            </a:r>
             <a:endParaRPr lang="en-US" dirty="0">
               <a:latin typeface="Roboto"/>
             </a:endParaRPr>
@@ -5790,7 +6489,79 @@
     </p:spTree>
     <p:extLst>
       <p:ext uri="{BB962C8B-B14F-4D97-AF65-F5344CB8AC3E}">
-        <p14:creationId xmlns:p14="http://schemas.microsoft.com/office/powerpoint/2010/main" val="1863585274"/>
+        <p14:creationId xmlns:p14="http://schemas.microsoft.com/office/powerpoint/2010/main" val="1390304271"/>
+      </p:ext>
+    </p:extLst>
+  </p:cSld>
+  <p:clrMapOvr>
+    <a:masterClrMapping/>
+  </p:clrMapOvr>
+</p:sld>
+</file>
+
+<file path=ppt/slides/slide9.xml><?xml version="1.0" encoding="utf-8"?>
+<p:sld xmlns:a="http://schemas.openxmlformats.org/drawingml/2006/main" xmlns:r="http://schemas.openxmlformats.org/officeDocument/2006/relationships" xmlns:p="http://schemas.openxmlformats.org/presentationml/2006/main">
+  <p:cSld>
+    <p:spTree>
+      <p:nvGrpSpPr>
+        <p:cNvPr id="1" name=""/>
+        <p:cNvGrpSpPr/>
+        <p:nvPr/>
+      </p:nvGrpSpPr>
+      <p:grpSpPr>
+        <a:xfrm>
+          <a:off x="0" y="0"/>
+          <a:ext cx="0" cy="0"/>
+          <a:chOff x="0" y="0"/>
+          <a:chExt cx="0" cy="0"/>
+        </a:xfrm>
+      </p:grpSpPr>
+      <p:sp>
+        <p:nvSpPr>
+          <p:cNvPr id="2" name="Title 1"/>
+          <p:cNvSpPr>
+            <a:spLocks noGrp="1"/>
+          </p:cNvSpPr>
+          <p:nvPr>
+            <p:ph type="title"/>
+          </p:nvPr>
+        </p:nvSpPr>
+        <p:spPr/>
+        <p:txBody>
+          <a:bodyPr/>
+          <a:lstStyle/>
+          <a:p>
+            <a:endParaRPr lang="en-US" dirty="0">
+              <a:latin typeface="Roboto"/>
+            </a:endParaRPr>
+          </a:p>
+        </p:txBody>
+      </p:sp>
+      <p:sp>
+        <p:nvSpPr>
+          <p:cNvPr id="3" name="Content Placeholder 2"/>
+          <p:cNvSpPr>
+            <a:spLocks noGrp="1"/>
+          </p:cNvSpPr>
+          <p:nvPr>
+            <p:ph idx="1"/>
+          </p:nvPr>
+        </p:nvSpPr>
+        <p:spPr/>
+        <p:txBody>
+          <a:bodyPr/>
+          <a:lstStyle/>
+          <a:p>
+            <a:endParaRPr lang="en-US" dirty="0">
+              <a:latin typeface="Roboto"/>
+            </a:endParaRPr>
+          </a:p>
+        </p:txBody>
+      </p:sp>
+    </p:spTree>
+    <p:extLst>
+      <p:ext uri="{BB962C8B-B14F-4D97-AF65-F5344CB8AC3E}">
+        <p14:creationId xmlns:p14="http://schemas.microsoft.com/office/powerpoint/2010/main" val="1930421405"/>
       </p:ext>
     </p:extLst>
   </p:cSld>

</xml_diff>

<commit_message>
adding cgo and up next slides
</commit_message>
<xml_diff>
--- a/assets/powerpoints/golang2.pptx
+++ b/assets/powerpoints/golang2.pptx
@@ -14,10 +14,10 @@
     <p:sldId id="263" r:id="rId5"/>
     <p:sldId id="267" r:id="rId6"/>
     <p:sldId id="260" r:id="rId7"/>
-    <p:sldId id="259" r:id="rId8"/>
-    <p:sldId id="265" r:id="rId9"/>
-    <p:sldId id="264" r:id="rId10"/>
-    <p:sldId id="261" r:id="rId11"/>
+    <p:sldId id="261" r:id="rId8"/>
+    <p:sldId id="259" r:id="rId9"/>
+    <p:sldId id="265" r:id="rId10"/>
+    <p:sldId id="264" r:id="rId11"/>
   </p:sldIdLst>
   <p:sldSz cx="12192000" cy="6858000"/>
   <p:notesSz cx="6858000" cy="9144000"/>
@@ -218,7 +218,7 @@
           <a:p>
             <a:fld id="{AB412791-CB19-4B63-9963-8A77FB30904D}" type="datetimeFigureOut">
               <a:rPr lang="en-US" smtClean="0"/>
-              <a:t>4/19/2019</a:t>
+              <a:t>4/22/2019</a:t>
             </a:fld>
             <a:endParaRPr lang="en-US"/>
           </a:p>
@@ -536,7 +536,15 @@
             </a:r>
             <a:r>
               <a:rPr lang="en-US" baseline="0" dirty="0" smtClean="0"/>
-              <a:t> agenda today will cover 5 topics </a:t>
+              <a:t> agenda today will cover </a:t>
+            </a:r>
+            <a:r>
+              <a:rPr lang="en-US" baseline="0" dirty="0" smtClean="0"/>
+              <a:t>7 </a:t>
+            </a:r>
+            <a:r>
+              <a:rPr lang="en-US" baseline="0" dirty="0" smtClean="0"/>
+              <a:t>topics </a:t>
             </a:r>
           </a:p>
           <a:p>
@@ -553,7 +561,19 @@
             </a:r>
             <a:r>
               <a:rPr lang="en-US" baseline="0" dirty="0" smtClean="0"/>
-              <a:t>/exec, delve the debugging tool and the variety of </a:t>
+              <a:t>/exec, </a:t>
+            </a:r>
+            <a:r>
+              <a:rPr lang="en-US" baseline="0" dirty="0" err="1" smtClean="0"/>
+              <a:t>Cgo</a:t>
+            </a:r>
+            <a:r>
+              <a:rPr lang="en-US" baseline="0" dirty="0" smtClean="0"/>
+              <a:t>, </a:t>
+            </a:r>
+            <a:r>
+              <a:rPr lang="en-US" baseline="0" dirty="0" smtClean="0"/>
+              <a:t>delve the debugging tool and the variety of </a:t>
             </a:r>
             <a:r>
               <a:rPr lang="en-US" baseline="0" dirty="0" err="1" smtClean="0"/>
@@ -1429,11 +1449,46 @@
           <a:p>
             <a:r>
               <a:rPr lang="en-US" dirty="0" smtClean="0"/>
-              <a:t>-Delve</a:t>
+              <a:t>The documentation for using </a:t>
+            </a:r>
+            <a:r>
+              <a:rPr lang="en-US" dirty="0" err="1" smtClean="0"/>
+              <a:t>Cgo</a:t>
             </a:r>
             <a:r>
               <a:rPr lang="en-US" baseline="0" dirty="0" smtClean="0"/>
-              <a:t> is the most popular open source debugger for </a:t>
+              <a:t> </a:t>
+            </a:r>
+            <a:r>
+              <a:rPr lang="en-US" dirty="0" smtClean="0"/>
+              <a:t>exists</a:t>
+            </a:r>
+            <a:r>
+              <a:rPr lang="en-US" baseline="0" dirty="0" smtClean="0"/>
+              <a:t> on the golang.org.</a:t>
+            </a:r>
+            <a:r>
+              <a:rPr lang="en-US" dirty="0" smtClean="0"/>
+              <a:t/>
+            </a:r>
+            <a:br>
+              <a:rPr lang="en-US" dirty="0" smtClean="0"/>
+            </a:br>
+            <a:r>
+              <a:rPr lang="en-US" dirty="0" smtClean="0"/>
+              <a:t>A time you would need</a:t>
+            </a:r>
+            <a:r>
+              <a:rPr lang="en-US" baseline="0" dirty="0" smtClean="0"/>
+              <a:t> this </a:t>
+            </a:r>
+            <a:r>
+              <a:rPr lang="en-US" dirty="0" smtClean="0"/>
+              <a:t>is when</a:t>
+            </a:r>
+            <a:r>
+              <a:rPr lang="en-US" baseline="0" dirty="0" smtClean="0"/>
+              <a:t> C has implemented a feature that doesn’t exist in </a:t>
             </a:r>
             <a:r>
               <a:rPr lang="en-US" baseline="0" dirty="0" err="1" smtClean="0"/>
@@ -1441,131 +1496,49 @@
             </a:r>
             <a:r>
               <a:rPr lang="en-US" baseline="0" dirty="0" smtClean="0"/>
-              <a:t> programming language.</a:t>
-            </a:r>
-          </a:p>
-          <a:p>
-            <a:r>
-              <a:rPr lang="en-US" baseline="0" dirty="0" smtClean="0"/>
-              <a:t>-The source code is hosted on </a:t>
+              <a:t> an example is a </a:t>
             </a:r>
             <a:r>
               <a:rPr lang="en-US" baseline="0" dirty="0" err="1" smtClean="0"/>
-              <a:t>github</a:t>
+              <a:t>webview</a:t>
             </a:r>
             <a:r>
               <a:rPr lang="en-US" baseline="0" dirty="0" smtClean="0"/>
               <a:t>.</a:t>
             </a:r>
+            <a:endParaRPr lang="en-US" dirty="0" smtClean="0">
+              <a:hlinkClick r:id="rId3"/>
+            </a:endParaRPr>
           </a:p>
           <a:p>
             <a:r>
               <a:rPr lang="en-US" baseline="0" dirty="0" smtClean="0"/>
-              <a:t>-Let’s practice by debugging </a:t>
+              <a:t>I found this out when I attempted to create a web browser using </a:t>
             </a:r>
             <a:r>
               <a:rPr lang="en-US" baseline="0" dirty="0" err="1" smtClean="0"/>
-              <a:t>point.go</a:t>
-            </a:r>
-            <a:endParaRPr lang="en-US" baseline="0" dirty="0" smtClean="0"/>
-          </a:p>
-          <a:p>
-            <a:endParaRPr lang="en-US" dirty="0" smtClean="0"/>
-          </a:p>
-          <a:p>
+              <a:t>golang</a:t>
+            </a:r>
+            <a:r>
+              <a:rPr lang="en-US" baseline="0" dirty="0" smtClean="0"/>
+              <a:t>. </a:t>
+            </a:r>
             <a:r>
               <a:rPr lang="en-US" dirty="0" smtClean="0">
                 <a:hlinkClick r:id="rId3"/>
               </a:rPr>
-              <a:t>https://github.com/go-delve/delve</a:t>
-            </a:r>
-            <a:endParaRPr lang="en-US" dirty="0" smtClean="0"/>
-          </a:p>
-          <a:p>
-            <a:r>
-              <a:rPr lang="en-US" dirty="0" smtClean="0"/>
-              <a:t>Start the</a:t>
-            </a:r>
-            <a:r>
-              <a:rPr lang="en-US" baseline="0" dirty="0" smtClean="0"/>
-              <a:t> debugger | </a:t>
-            </a:r>
-            <a:r>
-              <a:rPr lang="en-US" dirty="0" smtClean="0"/>
-              <a:t>dlv debug</a:t>
-            </a:r>
-          </a:p>
-          <a:p>
-            <a:r>
-              <a:rPr lang="en-US" dirty="0" smtClean="0"/>
-              <a:t>Set a</a:t>
-            </a:r>
-            <a:r>
-              <a:rPr lang="en-US" baseline="0" dirty="0" smtClean="0"/>
-              <a:t> breakpoint | break point.go:8</a:t>
-            </a:r>
-          </a:p>
-          <a:p>
-            <a:r>
-              <a:rPr lang="en-US" baseline="0" dirty="0" smtClean="0"/>
-              <a:t>List the breakpoints | breakpoints</a:t>
-            </a:r>
-          </a:p>
-          <a:p>
-            <a:r>
-              <a:rPr lang="en-US" baseline="0" dirty="0" err="1" smtClean="0"/>
-              <a:t>Goto</a:t>
-            </a:r>
-            <a:r>
-              <a:rPr lang="en-US" baseline="0" dirty="0" smtClean="0"/>
-              <a:t> breakpoint | continue</a:t>
-            </a:r>
-          </a:p>
-          <a:p>
-            <a:r>
-              <a:rPr lang="en-US" baseline="0" dirty="0" err="1" smtClean="0"/>
-              <a:t>Setover</a:t>
-            </a:r>
-            <a:r>
-              <a:rPr lang="en-US" baseline="0" dirty="0" smtClean="0"/>
-              <a:t> | n</a:t>
-            </a:r>
-          </a:p>
-          <a:p>
-            <a:r>
-              <a:rPr lang="en-US" baseline="0" dirty="0" smtClean="0"/>
-              <a:t>To print a variable | print (</a:t>
-            </a:r>
-            <a:r>
-              <a:rPr lang="en-US" baseline="0" dirty="0" err="1" smtClean="0"/>
-              <a:t>varName</a:t>
-            </a:r>
-            <a:r>
-              <a:rPr lang="en-US" baseline="0" dirty="0" smtClean="0"/>
-              <a:t>)</a:t>
-            </a:r>
-          </a:p>
-          <a:p>
-            <a:r>
-              <a:rPr lang="en-US" baseline="0" dirty="0" smtClean="0"/>
-              <a:t>Restart process | r</a:t>
-            </a:r>
-          </a:p>
-          <a:p>
-            <a:endParaRPr lang="en-US" baseline="0" dirty="0" smtClean="0"/>
-          </a:p>
-          <a:p>
-            <a:r>
-              <a:rPr lang="en-US" baseline="0" dirty="0" smtClean="0"/>
-              <a:t>Or just use the </a:t>
-            </a:r>
-            <a:r>
-              <a:rPr lang="en-US" baseline="0" dirty="0" err="1" smtClean="0"/>
-              <a:t>vscode</a:t>
-            </a:r>
-            <a:r>
-              <a:rPr lang="en-US" baseline="0" dirty="0" smtClean="0"/>
-              <a:t> GUI Debugger.</a:t>
+              <a:t/>
+            </a:r>
+            <a:br>
+              <a:rPr lang="en-US" dirty="0" smtClean="0">
+                <a:hlinkClick r:id="rId3"/>
+              </a:rPr>
+            </a:br>
+            <a:r>
+              <a:rPr lang="en-US" dirty="0" smtClean="0">
+                <a:hlinkClick r:id="rId3"/>
+              </a:rPr>
+              <a:t>https://github.com/zserge/webview</a:t>
             </a:r>
             <a:endParaRPr lang="en-US" dirty="0"/>
           </a:p>
@@ -1597,7 +1570,7 @@
     </p:spTree>
     <p:extLst>
       <p:ext uri="{BB962C8B-B14F-4D97-AF65-F5344CB8AC3E}">
-        <p14:creationId xmlns:p14="http://schemas.microsoft.com/office/powerpoint/2010/main" val="37682927"/>
+        <p14:creationId xmlns:p14="http://schemas.microsoft.com/office/powerpoint/2010/main" val="1933817798"/>
       </p:ext>
     </p:extLst>
   </p:cSld>
@@ -1653,6 +1626,230 @@
           <a:p>
             <a:r>
               <a:rPr lang="en-US" dirty="0" smtClean="0"/>
+              <a:t>-Delve</a:t>
+            </a:r>
+            <a:r>
+              <a:rPr lang="en-US" baseline="0" dirty="0" smtClean="0"/>
+              <a:t> is the most popular open source debugger for </a:t>
+            </a:r>
+            <a:r>
+              <a:rPr lang="en-US" baseline="0" dirty="0" err="1" smtClean="0"/>
+              <a:t>golang</a:t>
+            </a:r>
+            <a:r>
+              <a:rPr lang="en-US" baseline="0" dirty="0" smtClean="0"/>
+              <a:t> programming language.</a:t>
+            </a:r>
+          </a:p>
+          <a:p>
+            <a:r>
+              <a:rPr lang="en-US" baseline="0" dirty="0" smtClean="0"/>
+              <a:t>-The source code is hosted on </a:t>
+            </a:r>
+            <a:r>
+              <a:rPr lang="en-US" baseline="0" dirty="0" err="1" smtClean="0"/>
+              <a:t>github</a:t>
+            </a:r>
+            <a:r>
+              <a:rPr lang="en-US" baseline="0" dirty="0" smtClean="0"/>
+              <a:t>.</a:t>
+            </a:r>
+          </a:p>
+          <a:p>
+            <a:r>
+              <a:rPr lang="en-US" baseline="0" dirty="0" smtClean="0"/>
+              <a:t>-Let’s practice by debugging </a:t>
+            </a:r>
+            <a:r>
+              <a:rPr lang="en-US" baseline="0" dirty="0" err="1" smtClean="0"/>
+              <a:t>point.go</a:t>
+            </a:r>
+            <a:endParaRPr lang="en-US" baseline="0" dirty="0" smtClean="0"/>
+          </a:p>
+          <a:p>
+            <a:endParaRPr lang="en-US" dirty="0" smtClean="0"/>
+          </a:p>
+          <a:p>
+            <a:r>
+              <a:rPr lang="en-US" dirty="0" smtClean="0">
+                <a:hlinkClick r:id="rId3"/>
+              </a:rPr>
+              <a:t>https://github.com/go-delve/delve</a:t>
+            </a:r>
+            <a:endParaRPr lang="en-US" dirty="0" smtClean="0"/>
+          </a:p>
+          <a:p>
+            <a:r>
+              <a:rPr lang="en-US" dirty="0" smtClean="0"/>
+              <a:t>Start the</a:t>
+            </a:r>
+            <a:r>
+              <a:rPr lang="en-US" baseline="0" dirty="0" smtClean="0"/>
+              <a:t> debugger | </a:t>
+            </a:r>
+            <a:r>
+              <a:rPr lang="en-US" dirty="0" smtClean="0"/>
+              <a:t>dlv debug</a:t>
+            </a:r>
+          </a:p>
+          <a:p>
+            <a:r>
+              <a:rPr lang="en-US" dirty="0" smtClean="0"/>
+              <a:t>Set a</a:t>
+            </a:r>
+            <a:r>
+              <a:rPr lang="en-US" baseline="0" dirty="0" smtClean="0"/>
+              <a:t> breakpoint | break point.go:8</a:t>
+            </a:r>
+          </a:p>
+          <a:p>
+            <a:r>
+              <a:rPr lang="en-US" baseline="0" dirty="0" smtClean="0"/>
+              <a:t>List the breakpoints | breakpoints</a:t>
+            </a:r>
+          </a:p>
+          <a:p>
+            <a:r>
+              <a:rPr lang="en-US" baseline="0" dirty="0" err="1" smtClean="0"/>
+              <a:t>Goto</a:t>
+            </a:r>
+            <a:r>
+              <a:rPr lang="en-US" baseline="0" dirty="0" smtClean="0"/>
+              <a:t> breakpoint | continue</a:t>
+            </a:r>
+          </a:p>
+          <a:p>
+            <a:r>
+              <a:rPr lang="en-US" baseline="0" dirty="0" err="1" smtClean="0"/>
+              <a:t>Setover</a:t>
+            </a:r>
+            <a:r>
+              <a:rPr lang="en-US" baseline="0" dirty="0" smtClean="0"/>
+              <a:t> | n</a:t>
+            </a:r>
+          </a:p>
+          <a:p>
+            <a:r>
+              <a:rPr lang="en-US" baseline="0" dirty="0" smtClean="0"/>
+              <a:t>To print a variable | print (</a:t>
+            </a:r>
+            <a:r>
+              <a:rPr lang="en-US" baseline="0" dirty="0" err="1" smtClean="0"/>
+              <a:t>varName</a:t>
+            </a:r>
+            <a:r>
+              <a:rPr lang="en-US" baseline="0" dirty="0" smtClean="0"/>
+              <a:t>)</a:t>
+            </a:r>
+          </a:p>
+          <a:p>
+            <a:r>
+              <a:rPr lang="en-US" baseline="0" dirty="0" smtClean="0"/>
+              <a:t>Restart process | r</a:t>
+            </a:r>
+          </a:p>
+          <a:p>
+            <a:endParaRPr lang="en-US" baseline="0" dirty="0" smtClean="0"/>
+          </a:p>
+          <a:p>
+            <a:r>
+              <a:rPr lang="en-US" baseline="0" dirty="0" smtClean="0"/>
+              <a:t>Or just use the </a:t>
+            </a:r>
+            <a:r>
+              <a:rPr lang="en-US" baseline="0" dirty="0" err="1" smtClean="0"/>
+              <a:t>vscode</a:t>
+            </a:r>
+            <a:r>
+              <a:rPr lang="en-US" baseline="0" dirty="0" smtClean="0"/>
+              <a:t> GUI Debugger.</a:t>
+            </a:r>
+            <a:endParaRPr lang="en-US" dirty="0"/>
+          </a:p>
+        </p:txBody>
+      </p:sp>
+      <p:sp>
+        <p:nvSpPr>
+          <p:cNvPr id="4" name="Slide Number Placeholder 3"/>
+          <p:cNvSpPr>
+            <a:spLocks noGrp="1"/>
+          </p:cNvSpPr>
+          <p:nvPr>
+            <p:ph type="sldNum" sz="quarter" idx="10"/>
+          </p:nvPr>
+        </p:nvSpPr>
+        <p:spPr/>
+        <p:txBody>
+          <a:bodyPr/>
+          <a:lstStyle/>
+          <a:p>
+            <a:fld id="{E7485AFA-8529-45AE-977F-998C2B043712}" type="slidenum">
+              <a:rPr lang="en-US" smtClean="0"/>
+              <a:t>8</a:t>
+            </a:fld>
+            <a:endParaRPr lang="en-US"/>
+          </a:p>
+        </p:txBody>
+      </p:sp>
+    </p:spTree>
+    <p:extLst>
+      <p:ext uri="{BB962C8B-B14F-4D97-AF65-F5344CB8AC3E}">
+        <p14:creationId xmlns:p14="http://schemas.microsoft.com/office/powerpoint/2010/main" val="37682927"/>
+      </p:ext>
+    </p:extLst>
+  </p:cSld>
+  <p:clrMapOvr>
+    <a:masterClrMapping/>
+  </p:clrMapOvr>
+</p:notes>
+</file>
+
+<file path=ppt/notesSlides/notesSlide8.xml><?xml version="1.0" encoding="utf-8"?>
+<p:notes xmlns:a="http://schemas.openxmlformats.org/drawingml/2006/main" xmlns:r="http://schemas.openxmlformats.org/officeDocument/2006/relationships" xmlns:p="http://schemas.openxmlformats.org/presentationml/2006/main">
+  <p:cSld>
+    <p:spTree>
+      <p:nvGrpSpPr>
+        <p:cNvPr id="1" name=""/>
+        <p:cNvGrpSpPr/>
+        <p:nvPr/>
+      </p:nvGrpSpPr>
+      <p:grpSpPr>
+        <a:xfrm>
+          <a:off x="0" y="0"/>
+          <a:ext cx="0" cy="0"/>
+          <a:chOff x="0" y="0"/>
+          <a:chExt cx="0" cy="0"/>
+        </a:xfrm>
+      </p:grpSpPr>
+      <p:sp>
+        <p:nvSpPr>
+          <p:cNvPr id="2" name="Slide Image Placeholder 1"/>
+          <p:cNvSpPr>
+            <a:spLocks noGrp="1" noRot="1" noChangeAspect="1"/>
+          </p:cNvSpPr>
+          <p:nvPr>
+            <p:ph type="sldImg"/>
+          </p:nvPr>
+        </p:nvSpPr>
+        <p:spPr/>
+      </p:sp>
+      <p:sp>
+        <p:nvSpPr>
+          <p:cNvPr id="3" name="Notes Placeholder 2"/>
+          <p:cNvSpPr>
+            <a:spLocks noGrp="1"/>
+          </p:cNvSpPr>
+          <p:nvPr>
+            <p:ph type="body" idx="1"/>
+          </p:nvPr>
+        </p:nvSpPr>
+        <p:spPr/>
+        <p:txBody>
+          <a:bodyPr/>
+          <a:lstStyle/>
+          <a:p>
+            <a:r>
+              <a:rPr lang="en-US" dirty="0" smtClean="0"/>
               <a:t>- Gin </a:t>
             </a:r>
             <a:r>
@@ -1767,7 +1964,7 @@
           <a:p>
             <a:fld id="{E7485AFA-8529-45AE-977F-998C2B043712}" type="slidenum">
               <a:rPr lang="en-US" smtClean="0"/>
-              <a:t>8</a:t>
+              <a:t>9</a:t>
             </a:fld>
             <a:endParaRPr lang="en-US"/>
           </a:p>
@@ -1777,6 +1974,147 @@
     <p:extLst>
       <p:ext uri="{BB962C8B-B14F-4D97-AF65-F5344CB8AC3E}">
         <p14:creationId xmlns:p14="http://schemas.microsoft.com/office/powerpoint/2010/main" val="1403425414"/>
+      </p:ext>
+    </p:extLst>
+  </p:cSld>
+  <p:clrMapOvr>
+    <a:masterClrMapping/>
+  </p:clrMapOvr>
+</p:notes>
+</file>
+
+<file path=ppt/notesSlides/notesSlide9.xml><?xml version="1.0" encoding="utf-8"?>
+<p:notes xmlns:a="http://schemas.openxmlformats.org/drawingml/2006/main" xmlns:r="http://schemas.openxmlformats.org/officeDocument/2006/relationships" xmlns:p="http://schemas.openxmlformats.org/presentationml/2006/main">
+  <p:cSld>
+    <p:spTree>
+      <p:nvGrpSpPr>
+        <p:cNvPr id="1" name=""/>
+        <p:cNvGrpSpPr/>
+        <p:nvPr/>
+      </p:nvGrpSpPr>
+      <p:grpSpPr>
+        <a:xfrm>
+          <a:off x="0" y="0"/>
+          <a:ext cx="0" cy="0"/>
+          <a:chOff x="0" y="0"/>
+          <a:chExt cx="0" cy="0"/>
+        </a:xfrm>
+      </p:grpSpPr>
+      <p:sp>
+        <p:nvSpPr>
+          <p:cNvPr id="2" name="Slide Image Placeholder 1"/>
+          <p:cNvSpPr>
+            <a:spLocks noGrp="1" noRot="1" noChangeAspect="1"/>
+          </p:cNvSpPr>
+          <p:nvPr>
+            <p:ph type="sldImg"/>
+          </p:nvPr>
+        </p:nvSpPr>
+        <p:spPr/>
+      </p:sp>
+      <p:sp>
+        <p:nvSpPr>
+          <p:cNvPr id="3" name="Notes Placeholder 2"/>
+          <p:cNvSpPr>
+            <a:spLocks noGrp="1"/>
+          </p:cNvSpPr>
+          <p:nvPr>
+            <p:ph type="body" idx="1"/>
+          </p:nvPr>
+        </p:nvSpPr>
+        <p:spPr/>
+        <p:txBody>
+          <a:bodyPr/>
+          <a:lstStyle/>
+          <a:p>
+            <a:r>
+              <a:rPr lang="en-US" dirty="0" smtClean="0">
+                <a:latin typeface="Roboto"/>
+              </a:rPr>
+              <a:t>Create: GUI app using Fyne</a:t>
+            </a:r>
+          </a:p>
+          <a:p>
+            <a:r>
+              <a:rPr lang="en-US" dirty="0" smtClean="0">
+                <a:latin typeface="Roboto"/>
+              </a:rPr>
+              <a:t>Create: </a:t>
+            </a:r>
+            <a:r>
+              <a:rPr lang="en-US" dirty="0" err="1" smtClean="0">
+                <a:latin typeface="Roboto"/>
+              </a:rPr>
+              <a:t>Todo</a:t>
+            </a:r>
+            <a:r>
+              <a:rPr lang="en-US" dirty="0" smtClean="0">
+                <a:latin typeface="Roboto"/>
+              </a:rPr>
+              <a:t>-List Web Application</a:t>
+            </a:r>
+          </a:p>
+          <a:p>
+            <a:r>
+              <a:rPr lang="en-US" dirty="0" smtClean="0">
+                <a:latin typeface="Roboto"/>
+              </a:rPr>
+              <a:t>Create: Console application that pipes with other terminal commands</a:t>
+            </a:r>
+            <a:r>
+              <a:rPr lang="en-US" baseline="0" dirty="0" smtClean="0">
+                <a:latin typeface="Roboto"/>
+              </a:rPr>
+              <a:t> – So for example prettify the html or </a:t>
+            </a:r>
+            <a:r>
+              <a:rPr lang="en-US" baseline="0" dirty="0" err="1" smtClean="0">
+                <a:latin typeface="Roboto"/>
+              </a:rPr>
+              <a:t>json</a:t>
+            </a:r>
+            <a:r>
+              <a:rPr lang="en-US" baseline="0" dirty="0" smtClean="0">
+                <a:latin typeface="Roboto"/>
+              </a:rPr>
+              <a:t> result from the curl command.</a:t>
+            </a:r>
+            <a:endParaRPr lang="en-US" dirty="0" smtClean="0">
+              <a:latin typeface="Roboto"/>
+            </a:endParaRPr>
+          </a:p>
+          <a:p>
+            <a:endParaRPr lang="en-US" dirty="0"/>
+          </a:p>
+        </p:txBody>
+      </p:sp>
+      <p:sp>
+        <p:nvSpPr>
+          <p:cNvPr id="4" name="Slide Number Placeholder 3"/>
+          <p:cNvSpPr>
+            <a:spLocks noGrp="1"/>
+          </p:cNvSpPr>
+          <p:nvPr>
+            <p:ph type="sldNum" sz="quarter" idx="10"/>
+          </p:nvPr>
+        </p:nvSpPr>
+        <p:spPr/>
+        <p:txBody>
+          <a:bodyPr/>
+          <a:lstStyle/>
+          <a:p>
+            <a:fld id="{E7485AFA-8529-45AE-977F-998C2B043712}" type="slidenum">
+              <a:rPr lang="en-US" smtClean="0"/>
+              <a:t>10</a:t>
+            </a:fld>
+            <a:endParaRPr lang="en-US"/>
+          </a:p>
+        </p:txBody>
+      </p:sp>
+    </p:spTree>
+    <p:extLst>
+      <p:ext uri="{BB962C8B-B14F-4D97-AF65-F5344CB8AC3E}">
+        <p14:creationId xmlns:p14="http://schemas.microsoft.com/office/powerpoint/2010/main" val="744048452"/>
       </p:ext>
     </p:extLst>
   </p:cSld>
@@ -1917,7 +2255,7 @@
           <a:p>
             <a:fld id="{790ED757-B5C7-4A40-922E-B631E1D33579}" type="datetimeFigureOut">
               <a:rPr lang="en-US" smtClean="0"/>
-              <a:t>4/19/2019</a:t>
+              <a:t>4/22/2019</a:t>
             </a:fld>
             <a:endParaRPr lang="en-US"/>
           </a:p>
@@ -2087,7 +2425,7 @@
           <a:p>
             <a:fld id="{790ED757-B5C7-4A40-922E-B631E1D33579}" type="datetimeFigureOut">
               <a:rPr lang="en-US" smtClean="0"/>
-              <a:t>4/19/2019</a:t>
+              <a:t>4/22/2019</a:t>
             </a:fld>
             <a:endParaRPr lang="en-US"/>
           </a:p>
@@ -2267,7 +2605,7 @@
           <a:p>
             <a:fld id="{790ED757-B5C7-4A40-922E-B631E1D33579}" type="datetimeFigureOut">
               <a:rPr lang="en-US" smtClean="0"/>
-              <a:t>4/19/2019</a:t>
+              <a:t>4/22/2019</a:t>
             </a:fld>
             <a:endParaRPr lang="en-US"/>
           </a:p>
@@ -2437,7 +2775,7 @@
           <a:p>
             <a:fld id="{790ED757-B5C7-4A40-922E-B631E1D33579}" type="datetimeFigureOut">
               <a:rPr lang="en-US" smtClean="0"/>
-              <a:t>4/19/2019</a:t>
+              <a:t>4/22/2019</a:t>
             </a:fld>
             <a:endParaRPr lang="en-US"/>
           </a:p>
@@ -2683,7 +3021,7 @@
           <a:p>
             <a:fld id="{790ED757-B5C7-4A40-922E-B631E1D33579}" type="datetimeFigureOut">
               <a:rPr lang="en-US" smtClean="0"/>
-              <a:t>4/19/2019</a:t>
+              <a:t>4/22/2019</a:t>
             </a:fld>
             <a:endParaRPr lang="en-US"/>
           </a:p>
@@ -2915,7 +3253,7 @@
           <a:p>
             <a:fld id="{790ED757-B5C7-4A40-922E-B631E1D33579}" type="datetimeFigureOut">
               <a:rPr lang="en-US" smtClean="0"/>
-              <a:t>4/19/2019</a:t>
+              <a:t>4/22/2019</a:t>
             </a:fld>
             <a:endParaRPr lang="en-US"/>
           </a:p>
@@ -3282,7 +3620,7 @@
           <a:p>
             <a:fld id="{790ED757-B5C7-4A40-922E-B631E1D33579}" type="datetimeFigureOut">
               <a:rPr lang="en-US" smtClean="0"/>
-              <a:t>4/19/2019</a:t>
+              <a:t>4/22/2019</a:t>
             </a:fld>
             <a:endParaRPr lang="en-US"/>
           </a:p>
@@ -3400,7 +3738,7 @@
           <a:p>
             <a:fld id="{790ED757-B5C7-4A40-922E-B631E1D33579}" type="datetimeFigureOut">
               <a:rPr lang="en-US" smtClean="0"/>
-              <a:t>4/19/2019</a:t>
+              <a:t>4/22/2019</a:t>
             </a:fld>
             <a:endParaRPr lang="en-US"/>
           </a:p>
@@ -3495,7 +3833,7 @@
           <a:p>
             <a:fld id="{790ED757-B5C7-4A40-922E-B631E1D33579}" type="datetimeFigureOut">
               <a:rPr lang="en-US" smtClean="0"/>
-              <a:t>4/19/2019</a:t>
+              <a:t>4/22/2019</a:t>
             </a:fld>
             <a:endParaRPr lang="en-US"/>
           </a:p>
@@ -3772,7 +4110,7 @@
           <a:p>
             <a:fld id="{790ED757-B5C7-4A40-922E-B631E1D33579}" type="datetimeFigureOut">
               <a:rPr lang="en-US" smtClean="0"/>
-              <a:t>4/19/2019</a:t>
+              <a:t>4/22/2019</a:t>
             </a:fld>
             <a:endParaRPr lang="en-US"/>
           </a:p>
@@ -4025,7 +4363,7 @@
           <a:p>
             <a:fld id="{790ED757-B5C7-4A40-922E-B631E1D33579}" type="datetimeFigureOut">
               <a:rPr lang="en-US" smtClean="0"/>
-              <a:t>4/19/2019</a:t>
+              <a:t>4/22/2019</a:t>
             </a:fld>
             <a:endParaRPr lang="en-US"/>
           </a:p>
@@ -4238,7 +4576,7 @@
           <a:p>
             <a:fld id="{790ED757-B5C7-4A40-922E-B631E1D33579}" type="datetimeFigureOut">
               <a:rPr lang="en-US" smtClean="0"/>
-              <a:t>4/19/2019</a:t>
+              <a:t>4/22/2019</a:t>
             </a:fld>
             <a:endParaRPr lang="en-US"/>
           </a:p>
@@ -4736,6 +5074,12 @@
           <a:bodyPr/>
           <a:lstStyle/>
           <a:p>
+            <a:r>
+              <a:rPr lang="en-US" dirty="0" smtClean="0">
+                <a:latin typeface="Roboto"/>
+              </a:rPr>
+              <a:t>Up next:</a:t>
+            </a:r>
             <a:endParaRPr lang="en-US" dirty="0">
               <a:latin typeface="Roboto"/>
             </a:endParaRPr>
@@ -4757,6 +5101,42 @@
           <a:bodyPr/>
           <a:lstStyle/>
           <a:p>
+            <a:r>
+              <a:rPr lang="en-US" dirty="0" smtClean="0">
+                <a:latin typeface="Roboto"/>
+              </a:rPr>
+              <a:t>Create: GUI app using Fyne</a:t>
+            </a:r>
+          </a:p>
+          <a:p>
+            <a:r>
+              <a:rPr lang="en-US" dirty="0" smtClean="0">
+                <a:latin typeface="Roboto"/>
+              </a:rPr>
+              <a:t>Create: </a:t>
+            </a:r>
+            <a:r>
+              <a:rPr lang="en-US" dirty="0" err="1" smtClean="0">
+                <a:latin typeface="Roboto"/>
+              </a:rPr>
+              <a:t>Todo</a:t>
+            </a:r>
+            <a:r>
+              <a:rPr lang="en-US" dirty="0" smtClean="0">
+                <a:latin typeface="Roboto"/>
+              </a:rPr>
+              <a:t>-List Web Application</a:t>
+            </a:r>
+          </a:p>
+          <a:p>
+            <a:r>
+              <a:rPr lang="en-US" dirty="0" smtClean="0">
+                <a:latin typeface="Roboto"/>
+              </a:rPr>
+              <a:t>Create: Console application that pipes with other terminal 		      commands</a:t>
+            </a:r>
+          </a:p>
+          <a:p>
             <a:endParaRPr lang="en-US" dirty="0">
               <a:latin typeface="Roboto"/>
             </a:endParaRPr>
@@ -4766,13 +5146,20 @@
     </p:spTree>
     <p:extLst>
       <p:ext uri="{BB962C8B-B14F-4D97-AF65-F5344CB8AC3E}">
-        <p14:creationId xmlns:p14="http://schemas.microsoft.com/office/powerpoint/2010/main" val="1863585274"/>
+        <p14:creationId xmlns:p14="http://schemas.microsoft.com/office/powerpoint/2010/main" val="1930421405"/>
       </p:ext>
     </p:extLst>
   </p:cSld>
   <p:clrMapOvr>
     <a:masterClrMapping/>
   </p:clrMapOvr>
+  <p:timing>
+    <p:tnLst>
+      <p:par>
+        <p:cTn id="1" dur="indefinite" restart="never" nodeType="tmRoot"/>
+      </p:par>
+    </p:tnLst>
+  </p:timing>
 </p:sld>
 </file>
 
@@ -4877,6 +5264,27 @@
           </a:p>
           <a:p>
             <a:r>
+              <a:rPr lang="en-US" dirty="0" err="1" smtClean="0">
+                <a:latin typeface="Roboto"/>
+              </a:rPr>
+              <a:t>Cgo</a:t>
+            </a:r>
+            <a:r>
+              <a:rPr lang="en-US" dirty="0" smtClean="0">
+                <a:latin typeface="Roboto"/>
+              </a:rPr>
+              <a:t> </a:t>
+            </a:r>
+            <a:r>
+              <a:rPr lang="en-US" dirty="0"/>
+              <a:t> </a:t>
+            </a:r>
+            <a:endParaRPr lang="en-US" dirty="0" smtClean="0">
+              <a:latin typeface="Roboto"/>
+            </a:endParaRPr>
+          </a:p>
+          <a:p>
+            <a:r>
               <a:rPr lang="en-US" dirty="0" smtClean="0">
                 <a:latin typeface="Roboto"/>
               </a:rPr>
@@ -4921,6 +5329,13 @@
   <p:clrMapOvr>
     <a:masterClrMapping/>
   </p:clrMapOvr>
+  <p:timing>
+    <p:tnLst>
+      <p:par>
+        <p:cTn id="1" dur="indefinite" restart="never" nodeType="tmRoot"/>
+      </p:par>
+    </p:tnLst>
+  </p:timing>
 </p:sld>
 </file>
 
@@ -5629,6 +6044,13 @@
   <p:clrMapOvr>
     <a:masterClrMapping/>
   </p:clrMapOvr>
+  <p:timing>
+    <p:tnLst>
+      <p:par>
+        <p:cTn id="1" dur="indefinite" restart="never" nodeType="tmRoot"/>
+      </p:par>
+    </p:tnLst>
+  </p:timing>
 </p:sld>
 </file>
 
@@ -6582,10 +7004,10 @@
           <a:lstStyle/>
           <a:p>
             <a:r>
-              <a:rPr lang="en-US" dirty="0" smtClean="0">
-                <a:latin typeface="Roboto"/>
-              </a:rPr>
-              <a:t>Delve</a:t>
+              <a:rPr lang="en-US" dirty="0" err="1" smtClean="0">
+                <a:latin typeface="Roboto"/>
+              </a:rPr>
+              <a:t>Cgo</a:t>
             </a:r>
             <a:endParaRPr lang="en-US" dirty="0">
               <a:latin typeface="Roboto"/>
@@ -6612,48 +7034,64 @@
               <a:rPr lang="en-US" dirty="0" smtClean="0">
                 <a:latin typeface="Roboto"/>
               </a:rPr>
-              <a:t>Delve the debugger for </a:t>
-            </a:r>
-            <a:r>
-              <a:rPr lang="en-US" dirty="0" err="1" smtClean="0">
-                <a:latin typeface="Roboto"/>
-              </a:rPr>
-              <a:t>Golang</a:t>
-            </a:r>
-            <a:endParaRPr lang="en-US" dirty="0" smtClean="0">
+              <a:t>Enables </a:t>
+            </a:r>
+            <a:r>
+              <a:rPr lang="en-US" dirty="0">
+                <a:latin typeface="Roboto"/>
+              </a:rPr>
+              <a:t>the creation of Go packages that call C code</a:t>
+            </a:r>
+            <a:r>
+              <a:rPr lang="en-US" dirty="0" smtClean="0">
+                <a:latin typeface="Roboto"/>
+              </a:rPr>
+              <a:t>.</a:t>
+            </a:r>
+          </a:p>
+          <a:p>
+            <a:r>
+              <a:rPr lang="en-US" dirty="0" smtClean="0">
+                <a:latin typeface="Roboto"/>
+              </a:rPr>
+              <a:t>Documentation:</a:t>
+            </a:r>
+            <a:r>
+              <a:rPr lang="en-US" dirty="0" smtClean="0">
+                <a:hlinkClick r:id="rId3"/>
+              </a:rPr>
+              <a:t> </a:t>
+            </a:r>
+            <a:r>
+              <a:rPr lang="en-US" dirty="0">
+                <a:hlinkClick r:id="rId3"/>
+              </a:rPr>
+              <a:t>https://golang.org/cmd/cgo</a:t>
+            </a:r>
+            <a:r>
+              <a:rPr lang="en-US" dirty="0" smtClean="0">
+                <a:hlinkClick r:id="rId3"/>
+              </a:rPr>
+              <a:t>/</a:t>
+            </a:r>
+            <a:endParaRPr lang="en-US" dirty="0">
               <a:latin typeface="Roboto"/>
             </a:endParaRPr>
           </a:p>
           <a:p>
             <a:r>
               <a:rPr lang="en-US" dirty="0" smtClean="0">
-                <a:hlinkClick r:id="rId3"/>
-              </a:rPr>
-              <a:t>https://github.com/go-delve/d</a:t>
-            </a:r>
-          </a:p>
-          <a:p>
-            <a:r>
-              <a:rPr lang="en-US" dirty="0" smtClean="0">
-                <a:latin typeface="Roboto"/>
-              </a:rPr>
-              <a:t>Debugging </a:t>
+                <a:latin typeface="Roboto"/>
+              </a:rPr>
+              <a:t>Example: </a:t>
             </a:r>
             <a:r>
               <a:rPr lang="en-US" dirty="0" err="1" smtClean="0">
                 <a:latin typeface="Roboto"/>
               </a:rPr>
-              <a:t>point.go</a:t>
-            </a:r>
-            <a:endParaRPr lang="en-US" dirty="0" smtClean="0">
-              <a:latin typeface="Roboto"/>
-            </a:endParaRPr>
-          </a:p>
-          <a:p>
-            <a:pPr marL="0" indent="0">
-              <a:buNone/>
-            </a:pPr>
-            <a:endParaRPr lang="en-US" dirty="0" smtClean="0">
+              <a:t>Webview</a:t>
+            </a:r>
+            <a:endParaRPr lang="en-US" dirty="0">
               <a:latin typeface="Roboto"/>
             </a:endParaRPr>
           </a:p>
@@ -6662,7 +7100,7 @@
     </p:spTree>
     <p:extLst>
       <p:ext uri="{BB962C8B-B14F-4D97-AF65-F5344CB8AC3E}">
-        <p14:creationId xmlns:p14="http://schemas.microsoft.com/office/powerpoint/2010/main" val="3973462481"/>
+        <p14:creationId xmlns:p14="http://schemas.microsoft.com/office/powerpoint/2010/main" val="1863585274"/>
       </p:ext>
     </p:extLst>
   </p:cSld>
@@ -6712,16 +7150,10 @@
           <a:lstStyle/>
           <a:p>
             <a:r>
-              <a:rPr lang="en-US" dirty="0" err="1" smtClean="0">
-                <a:latin typeface="Roboto"/>
-              </a:rPr>
-              <a:t>Golang</a:t>
-            </a:r>
-            <a:r>
               <a:rPr lang="en-US" dirty="0" smtClean="0">
                 <a:latin typeface="Roboto"/>
               </a:rPr>
-              <a:t> Development Frameworks</a:t>
+              <a:t>Delve</a:t>
             </a:r>
             <a:endParaRPr lang="en-US" dirty="0">
               <a:latin typeface="Roboto"/>
@@ -6748,13 +7180,13 @@
               <a:rPr lang="en-US" dirty="0" smtClean="0">
                 <a:latin typeface="Roboto"/>
               </a:rPr>
-              <a:t>Gin </a:t>
+              <a:t>Delve the debugger for </a:t>
             </a:r>
             <a:r>
               <a:rPr lang="en-US" dirty="0" err="1" smtClean="0">
                 <a:latin typeface="Roboto"/>
               </a:rPr>
-              <a:t>Gonic</a:t>
+              <a:t>Golang</a:t>
             </a:r>
             <a:endParaRPr lang="en-US" dirty="0" smtClean="0">
               <a:latin typeface="Roboto"/>
@@ -6763,10 +7195,149 @@
           <a:p>
             <a:r>
               <a:rPr lang="en-US" dirty="0" smtClean="0">
-                <a:latin typeface="Roboto"/>
-              </a:rPr>
-              <a:t>GXUI</a:t>
-            </a:r>
+                <a:hlinkClick r:id="rId3"/>
+              </a:rPr>
+              <a:t>https://github.com/go-delve/d</a:t>
+            </a:r>
+          </a:p>
+          <a:p>
+            <a:r>
+              <a:rPr lang="en-US" dirty="0" smtClean="0">
+                <a:latin typeface="Roboto"/>
+              </a:rPr>
+              <a:t>Debugging </a:t>
+            </a:r>
+            <a:r>
+              <a:rPr lang="en-US" dirty="0" err="1" smtClean="0">
+                <a:latin typeface="Roboto"/>
+              </a:rPr>
+              <a:t>point.go</a:t>
+            </a:r>
+            <a:endParaRPr lang="en-US" dirty="0" smtClean="0">
+              <a:latin typeface="Roboto"/>
+            </a:endParaRPr>
+          </a:p>
+          <a:p>
+            <a:pPr marL="0" indent="0">
+              <a:buNone/>
+            </a:pPr>
+            <a:endParaRPr lang="en-US" dirty="0" smtClean="0">
+              <a:latin typeface="Roboto"/>
+            </a:endParaRPr>
+          </a:p>
+        </p:txBody>
+      </p:sp>
+    </p:spTree>
+    <p:extLst>
+      <p:ext uri="{BB962C8B-B14F-4D97-AF65-F5344CB8AC3E}">
+        <p14:creationId xmlns:p14="http://schemas.microsoft.com/office/powerpoint/2010/main" val="3973462481"/>
+      </p:ext>
+    </p:extLst>
+  </p:cSld>
+  <p:clrMapOvr>
+    <a:masterClrMapping/>
+  </p:clrMapOvr>
+  <p:timing>
+    <p:tnLst>
+      <p:par>
+        <p:cTn id="1" dur="indefinite" restart="never" nodeType="tmRoot"/>
+      </p:par>
+    </p:tnLst>
+  </p:timing>
+</p:sld>
+</file>
+
+<file path=ppt/slides/slide9.xml><?xml version="1.0" encoding="utf-8"?>
+<p:sld xmlns:a="http://schemas.openxmlformats.org/drawingml/2006/main" xmlns:r="http://schemas.openxmlformats.org/officeDocument/2006/relationships" xmlns:p="http://schemas.openxmlformats.org/presentationml/2006/main">
+  <p:cSld>
+    <p:spTree>
+      <p:nvGrpSpPr>
+        <p:cNvPr id="1" name=""/>
+        <p:cNvGrpSpPr/>
+        <p:nvPr/>
+      </p:nvGrpSpPr>
+      <p:grpSpPr>
+        <a:xfrm>
+          <a:off x="0" y="0"/>
+          <a:ext cx="0" cy="0"/>
+          <a:chOff x="0" y="0"/>
+          <a:chExt cx="0" cy="0"/>
+        </a:xfrm>
+      </p:grpSpPr>
+      <p:sp>
+        <p:nvSpPr>
+          <p:cNvPr id="2" name="Title 1"/>
+          <p:cNvSpPr>
+            <a:spLocks noGrp="1"/>
+          </p:cNvSpPr>
+          <p:nvPr>
+            <p:ph type="title"/>
+          </p:nvPr>
+        </p:nvSpPr>
+        <p:spPr/>
+        <p:txBody>
+          <a:bodyPr/>
+          <a:lstStyle/>
+          <a:p>
+            <a:r>
+              <a:rPr lang="en-US" dirty="0" err="1" smtClean="0">
+                <a:latin typeface="Roboto"/>
+              </a:rPr>
+              <a:t>Golang</a:t>
+            </a:r>
+            <a:r>
+              <a:rPr lang="en-US" dirty="0" smtClean="0">
+                <a:latin typeface="Roboto"/>
+              </a:rPr>
+              <a:t> Development Frameworks</a:t>
+            </a:r>
+            <a:endParaRPr lang="en-US" dirty="0">
+              <a:latin typeface="Roboto"/>
+            </a:endParaRPr>
+          </a:p>
+        </p:txBody>
+      </p:sp>
+      <p:sp>
+        <p:nvSpPr>
+          <p:cNvPr id="3" name="Content Placeholder 2"/>
+          <p:cNvSpPr>
+            <a:spLocks noGrp="1"/>
+          </p:cNvSpPr>
+          <p:nvPr>
+            <p:ph idx="1"/>
+          </p:nvPr>
+        </p:nvSpPr>
+        <p:spPr/>
+        <p:txBody>
+          <a:bodyPr/>
+          <a:lstStyle/>
+          <a:p>
+            <a:r>
+              <a:rPr lang="en-US" dirty="0" smtClean="0">
+                <a:latin typeface="Roboto"/>
+              </a:rPr>
+              <a:t>Gin </a:t>
+            </a:r>
+            <a:r>
+              <a:rPr lang="en-US" dirty="0" err="1" smtClean="0">
+                <a:latin typeface="Roboto"/>
+              </a:rPr>
+              <a:t>Gonic</a:t>
+            </a:r>
+            <a:endParaRPr lang="en-US" dirty="0" smtClean="0">
+              <a:latin typeface="Roboto"/>
+            </a:endParaRPr>
+          </a:p>
+          <a:p>
+            <a:r>
+              <a:rPr lang="en-US" dirty="0" smtClean="0">
+                <a:latin typeface="Roboto"/>
+              </a:rPr>
+              <a:t>GXUI, Fyne</a:t>
+            </a:r>
+            <a:endParaRPr lang="en-US" dirty="0" smtClean="0">
+              <a:latin typeface="Roboto"/>
+            </a:endParaRPr>
           </a:p>
           <a:p>
             <a:r>
@@ -6873,84 +7444,13 @@
   <p:clrMapOvr>
     <a:masterClrMapping/>
   </p:clrMapOvr>
-</p:sld>
-</file>
-
-<file path=ppt/slides/slide9.xml><?xml version="1.0" encoding="utf-8"?>
-<p:sld xmlns:a="http://schemas.openxmlformats.org/drawingml/2006/main" xmlns:r="http://schemas.openxmlformats.org/officeDocument/2006/relationships" xmlns:p="http://schemas.openxmlformats.org/presentationml/2006/main">
-  <p:cSld>
-    <p:spTree>
-      <p:nvGrpSpPr>
-        <p:cNvPr id="1" name=""/>
-        <p:cNvGrpSpPr/>
-        <p:nvPr/>
-      </p:nvGrpSpPr>
-      <p:grpSpPr>
-        <a:xfrm>
-          <a:off x="0" y="0"/>
-          <a:ext cx="0" cy="0"/>
-          <a:chOff x="0" y="0"/>
-          <a:chExt cx="0" cy="0"/>
-        </a:xfrm>
-      </p:grpSpPr>
-      <p:sp>
-        <p:nvSpPr>
-          <p:cNvPr id="2" name="Title 1"/>
-          <p:cNvSpPr>
-            <a:spLocks noGrp="1"/>
-          </p:cNvSpPr>
-          <p:nvPr>
-            <p:ph type="title"/>
-          </p:nvPr>
-        </p:nvSpPr>
-        <p:spPr/>
-        <p:txBody>
-          <a:bodyPr/>
-          <a:lstStyle/>
-          <a:p>
-            <a:r>
-              <a:rPr lang="en-US" dirty="0" smtClean="0">
-                <a:latin typeface="Roboto"/>
-              </a:rPr>
-              <a:t>Up next:</a:t>
-            </a:r>
-            <a:endParaRPr lang="en-US" dirty="0">
-              <a:latin typeface="Roboto"/>
-            </a:endParaRPr>
-          </a:p>
-        </p:txBody>
-      </p:sp>
-      <p:sp>
-        <p:nvSpPr>
-          <p:cNvPr id="3" name="Content Placeholder 2"/>
-          <p:cNvSpPr>
-            <a:spLocks noGrp="1"/>
-          </p:cNvSpPr>
-          <p:nvPr>
-            <p:ph idx="1"/>
-          </p:nvPr>
-        </p:nvSpPr>
-        <p:spPr/>
-        <p:txBody>
-          <a:bodyPr/>
-          <a:lstStyle/>
-          <a:p>
-            <a:endParaRPr lang="en-US" dirty="0">
-              <a:latin typeface="Roboto"/>
-            </a:endParaRPr>
-          </a:p>
-        </p:txBody>
-      </p:sp>
-    </p:spTree>
-    <p:extLst>
-      <p:ext uri="{BB962C8B-B14F-4D97-AF65-F5344CB8AC3E}">
-        <p14:creationId xmlns:p14="http://schemas.microsoft.com/office/powerpoint/2010/main" val="1930421405"/>
-      </p:ext>
-    </p:extLst>
-  </p:cSld>
-  <p:clrMapOvr>
-    <a:masterClrMapping/>
-  </p:clrMapOvr>
+  <p:timing>
+    <p:tnLst>
+      <p:par>
+        <p:cTn id="1" dur="indefinite" restart="never" nodeType="tmRoot"/>
+      </p:par>
+    </p:tnLst>
+  </p:timing>
 </p:sld>
 </file>
 

</xml_diff>

<commit_message>
updating PPT, removing comment from shapes.go
</commit_message>
<xml_diff>
--- a/assets/powerpoints/golang2.pptx
+++ b/assets/powerpoints/golang2.pptx
@@ -536,15 +536,7 @@
             </a:r>
             <a:r>
               <a:rPr lang="en-US" baseline="0" dirty="0" smtClean="0"/>
-              <a:t> agenda today will cover </a:t>
-            </a:r>
-            <a:r>
-              <a:rPr lang="en-US" baseline="0" dirty="0" smtClean="0"/>
-              <a:t>7 </a:t>
-            </a:r>
-            <a:r>
-              <a:rPr lang="en-US" baseline="0" dirty="0" smtClean="0"/>
-              <a:t>topics </a:t>
+              <a:t> agenda today will cover 7 topics </a:t>
             </a:r>
           </a:p>
           <a:p>
@@ -569,11 +561,7 @@
             </a:r>
             <a:r>
               <a:rPr lang="en-US" baseline="0" dirty="0" smtClean="0"/>
-              <a:t>, </a:t>
-            </a:r>
-            <a:r>
-              <a:rPr lang="en-US" baseline="0" dirty="0" smtClean="0"/>
-              <a:t>delve the debugging tool and the variety of </a:t>
+              <a:t>, delve the debugging tool and the variety of </a:t>
             </a:r>
             <a:r>
               <a:rPr lang="en-US" baseline="0" dirty="0" err="1" smtClean="0"/>
@@ -2077,7 +2065,44 @@
               <a:rPr lang="en-US" baseline="0" dirty="0" smtClean="0">
                 <a:latin typeface="Roboto"/>
               </a:rPr>
-              <a:t> result from the curl command.</a:t>
+              <a:t> result from the curl command</a:t>
+            </a:r>
+            <a:r>
+              <a:rPr lang="en-US" baseline="0" dirty="0" smtClean="0">
+                <a:latin typeface="Roboto"/>
+              </a:rPr>
+              <a:t>.</a:t>
+            </a:r>
+          </a:p>
+          <a:p>
+            <a:pPr marL="0" marR="0" lvl="0" indent="0" algn="l" defTabSz="914400" rtl="0" eaLnBrk="1" fontAlgn="auto" latinLnBrk="0" hangingPunct="1">
+              <a:lnSpc>
+                <a:spcPct val="100000"/>
+              </a:lnSpc>
+              <a:spcBef>
+                <a:spcPts val="0"/>
+              </a:spcBef>
+              <a:spcAft>
+                <a:spcPts val="0"/>
+              </a:spcAft>
+              <a:buClrTx/>
+              <a:buSzTx/>
+              <a:buFontTx/>
+              <a:buNone/>
+              <a:tabLst/>
+              <a:defRPr/>
+            </a:pPr>
+            <a:r>
+              <a:rPr lang="en-US" dirty="0" smtClean="0">
+                <a:latin typeface="Roboto"/>
+              </a:rPr>
+              <a:t>Create: Mobile App using </a:t>
+            </a:r>
+            <a:r>
+              <a:rPr lang="en-US" dirty="0" err="1" smtClean="0">
+                <a:latin typeface="Roboto"/>
+              </a:rPr>
+              <a:t>GoMobile</a:t>
             </a:r>
             <a:endParaRPr lang="en-US" dirty="0" smtClean="0">
               <a:latin typeface="Roboto"/>
@@ -5105,14 +5130,29 @@
               <a:rPr lang="en-US" dirty="0" smtClean="0">
                 <a:latin typeface="Roboto"/>
               </a:rPr>
-              <a:t>Create: GUI app using Fyne</a:t>
-            </a:r>
-          </a:p>
-          <a:p>
+              <a:t>Create: GUI app using </a:t>
+            </a:r>
             <a:r>
               <a:rPr lang="en-US" dirty="0" smtClean="0">
                 <a:latin typeface="Roboto"/>
               </a:rPr>
+              <a:t>Fyne Or </a:t>
+            </a:r>
+            <a:r>
+              <a:rPr lang="en-US" dirty="0" err="1" smtClean="0">
+                <a:latin typeface="Roboto"/>
+              </a:rPr>
+              <a:t>Qt</a:t>
+            </a:r>
+            <a:endParaRPr lang="en-US" dirty="0" smtClean="0">
+              <a:latin typeface="Roboto"/>
+            </a:endParaRPr>
+          </a:p>
+          <a:p>
+            <a:r>
+              <a:rPr lang="en-US" dirty="0" smtClean="0">
+                <a:latin typeface="Roboto"/>
+              </a:rPr>
               <a:t>Create: </a:t>
             </a:r>
             <a:r>
@@ -5137,6 +5177,24 @@
             </a:r>
           </a:p>
           <a:p>
+            <a:r>
+              <a:rPr lang="en-US" dirty="0" smtClean="0">
+                <a:latin typeface="Roboto"/>
+              </a:rPr>
+              <a:t>Create: Mobile Ap</a:t>
+            </a:r>
+            <a:r>
+              <a:rPr lang="en-US" dirty="0" smtClean="0">
+                <a:latin typeface="Roboto"/>
+              </a:rPr>
+              <a:t>p using </a:t>
+            </a:r>
+            <a:r>
+              <a:rPr lang="en-US" dirty="0" err="1" smtClean="0">
+                <a:latin typeface="Roboto"/>
+              </a:rPr>
+              <a:t>GoMobile</a:t>
+            </a:r>
             <a:endParaRPr lang="en-US" dirty="0">
               <a:latin typeface="Roboto"/>
             </a:endParaRPr>
@@ -7335,9 +7393,6 @@
               </a:rPr>
               <a:t>GXUI, Fyne</a:t>
             </a:r>
-            <a:endParaRPr lang="en-US" dirty="0" smtClean="0">
-              <a:latin typeface="Roboto"/>
-            </a:endParaRPr>
           </a:p>
           <a:p>
             <a:r>

</xml_diff>